<commit_message>
pptx with demo narration
</commit_message>
<xml_diff>
--- a/access_modifiers/acess_modifiers.pptx
+++ b/access_modifiers/acess_modifiers.pptx
@@ -5,7 +5,7 @@
     <p:sldMasterId id="2147483733" r:id="rId1"/>
   </p:sldMasterIdLst>
   <p:notesMasterIdLst>
-    <p:notesMasterId r:id="rId13"/>
+    <p:notesMasterId r:id="rId24"/>
   </p:notesMasterIdLst>
   <p:sldIdLst>
     <p:sldId id="257" r:id="rId2"/>
@@ -19,6 +19,17 @@
     <p:sldId id="265" r:id="rId10"/>
     <p:sldId id="268" r:id="rId11"/>
     <p:sldId id="266" r:id="rId12"/>
+    <p:sldId id="269" r:id="rId13"/>
+    <p:sldId id="270" r:id="rId14"/>
+    <p:sldId id="273" r:id="rId15"/>
+    <p:sldId id="272" r:id="rId16"/>
+    <p:sldId id="275" r:id="rId17"/>
+    <p:sldId id="271" r:id="rId18"/>
+    <p:sldId id="281" r:id="rId19"/>
+    <p:sldId id="276" r:id="rId20"/>
+    <p:sldId id="277" r:id="rId21"/>
+    <p:sldId id="278" r:id="rId22"/>
+    <p:sldId id="280" r:id="rId23"/>
   </p:sldIdLst>
   <p:sldSz cx="12192000" cy="6858000"/>
   <p:notesSz cx="6858000" cy="9144000"/>
@@ -748,6 +759,972 @@
 </p:notes>
 </file>
 
+<file path=ppt/notesSlides/notesSlide12.xml><?xml version="1.0" encoding="utf-8"?>
+<p:notes xmlns:a="http://schemas.openxmlformats.org/drawingml/2006/main" xmlns:r="http://schemas.openxmlformats.org/officeDocument/2006/relationships" xmlns:p="http://schemas.openxmlformats.org/presentationml/2006/main">
+  <p:cSld>
+    <p:spTree>
+      <p:nvGrpSpPr>
+        <p:cNvPr id="1" name=""/>
+        <p:cNvGrpSpPr/>
+        <p:nvPr/>
+      </p:nvGrpSpPr>
+      <p:grpSpPr>
+        <a:xfrm>
+          <a:off x="0" y="0"/>
+          <a:ext cx="0" cy="0"/>
+          <a:chOff x="0" y="0"/>
+          <a:chExt cx="0" cy="0"/>
+        </a:xfrm>
+      </p:grpSpPr>
+      <p:sp>
+        <p:nvSpPr>
+          <p:cNvPr id="2" name="Slide Image Placeholder 1"/>
+          <p:cNvSpPr>
+            <a:spLocks noGrp="1" noRot="1" noChangeAspect="1"/>
+          </p:cNvSpPr>
+          <p:nvPr>
+            <p:ph type="sldImg"/>
+          </p:nvPr>
+        </p:nvSpPr>
+        <p:spPr/>
+      </p:sp>
+      <p:sp>
+        <p:nvSpPr>
+          <p:cNvPr id="3" name="Notes Placeholder 2"/>
+          <p:cNvSpPr>
+            <a:spLocks noGrp="1"/>
+          </p:cNvSpPr>
+          <p:nvPr>
+            <p:ph type="body" idx="1"/>
+          </p:nvPr>
+        </p:nvSpPr>
+        <p:spPr/>
+        <p:txBody>
+          <a:bodyPr/>
+          <a:lstStyle/>
+          <a:p>
+            <a:r>
+              <a:rPr lang="en-US" dirty="0"/>
+              <a:t>__CHECKOUT equals-implementing-class__</a:t>
+            </a:r>
+          </a:p>
+          <a:p>
+            <a:endParaRPr lang="en-US" dirty="0"/>
+          </a:p>
+          <a:p>
+            <a:r>
+              <a:rPr lang="en-US" dirty="0"/>
+              <a:t>__OPEN THE CLASS__</a:t>
+            </a:r>
+          </a:p>
+          <a:p>
+            <a:endParaRPr lang="en-US" dirty="0"/>
+          </a:p>
+          <a:p>
+            <a:r>
+              <a:rPr lang="en-US" dirty="0"/>
+              <a:t>Here we have a simple class that contains two private, a protected and a public field. There can be other fields and methods in a real life code. In our case we only want to compare the instances of this class based on the equality of the values of these fields. Let's create an equals() method.</a:t>
+            </a:r>
+          </a:p>
+          <a:p>
+            <a:endParaRPr lang="en-US" dirty="0"/>
+          </a:p>
+          <a:p>
+            <a:r>
+              <a:rPr lang="en-US" dirty="0"/>
+              <a:t>__ press Command-N and select with the down arrow equals() and </a:t>
+            </a:r>
+            <a:r>
+              <a:rPr lang="en-US" dirty="0" err="1"/>
+              <a:t>hashCode</a:t>
+            </a:r>
+            <a:r>
+              <a:rPr lang="en-US" dirty="0"/>
+              <a:t>()__</a:t>
+            </a:r>
+          </a:p>
+          <a:p>
+            <a:endParaRPr lang="en-US" dirty="0"/>
+          </a:p>
+          <a:p>
+            <a:r>
+              <a:rPr lang="en-US" dirty="0"/>
+              <a:t>We will use the editor built-in code generator to create the code for us. Every IDE has this functionality and they usually generate appropriate code. The IDE does not offer the generation of the equals() method without the </a:t>
+            </a:r>
+            <a:r>
+              <a:rPr lang="en-US" dirty="0" err="1"/>
+              <a:t>hashCode</a:t>
+            </a:r>
+            <a:r>
+              <a:rPr lang="en-US" dirty="0"/>
+              <a:t>() because equals() and </a:t>
+            </a:r>
+            <a:r>
+              <a:rPr lang="en-US" dirty="0" err="1"/>
+              <a:t>hashCode</a:t>
+            </a:r>
+            <a:r>
+              <a:rPr lang="en-US" dirty="0"/>
+              <a:t>() have to be implemented in a consistent way and this way the IDE does not promote the generation of the one without the other. However, equals() and </a:t>
+            </a:r>
+            <a:r>
+              <a:rPr lang="en-US" dirty="0" err="1"/>
+              <a:t>hashCode</a:t>
+            </a:r>
+            <a:r>
+              <a:rPr lang="en-US" dirty="0"/>
+              <a:t>() are a whole other topic, that we may talk about in a different tutorial.</a:t>
+            </a:r>
+          </a:p>
+          <a:p>
+            <a:endParaRPr lang="en-US" dirty="0"/>
+          </a:p>
+          <a:p>
+            <a:r>
+              <a:rPr lang="en-US" dirty="0"/>
+              <a:t>__press next__</a:t>
+            </a:r>
+          </a:p>
+          <a:p>
+            <a:endParaRPr lang="en-US" dirty="0"/>
+          </a:p>
+          <a:p>
+            <a:r>
+              <a:rPr lang="en-US" dirty="0"/>
+              <a:t>__press next__</a:t>
+            </a:r>
+          </a:p>
+          <a:p>
+            <a:endParaRPr lang="en-US" dirty="0"/>
+          </a:p>
+          <a:p>
+            <a:r>
+              <a:rPr lang="en-US" dirty="0"/>
+              <a:t>__press next__</a:t>
+            </a:r>
+          </a:p>
+          <a:p>
+            <a:endParaRPr lang="en-US" dirty="0"/>
+          </a:p>
+          <a:p>
+            <a:r>
+              <a:rPr lang="en-US" dirty="0"/>
+              <a:t>We select all fields as guaranteed as non-null. Do not think too much about it. We only do that to have a code from the generator that is simpler missing the null checks that are none of our concerns now. But only now, in real life it is a crucial issue.</a:t>
+            </a:r>
+          </a:p>
+          <a:p>
+            <a:endParaRPr lang="en-US" dirty="0"/>
+          </a:p>
+          <a:p>
+            <a:r>
+              <a:rPr lang="en-US" dirty="0"/>
+              <a:t>__ select all the fields one by one and press next__ </a:t>
+            </a:r>
+          </a:p>
+          <a:p>
+            <a:endParaRPr lang="en-US" dirty="0"/>
+          </a:p>
+          <a:p>
+            <a:r>
+              <a:rPr lang="en-US" dirty="0"/>
+              <a:t>By now we are not interested in the </a:t>
+            </a:r>
+            <a:r>
+              <a:rPr lang="en-US" dirty="0" err="1"/>
+              <a:t>hashCode</a:t>
+            </a:r>
+            <a:r>
+              <a:rPr lang="en-US" dirty="0"/>
+              <a:t> method.</a:t>
+            </a:r>
+          </a:p>
+          <a:p>
+            <a:endParaRPr lang="en-US" dirty="0"/>
+          </a:p>
+          <a:p>
+            <a:r>
+              <a:rPr lang="en-US" dirty="0"/>
+              <a:t>__COLLAPSE THE </a:t>
+            </a:r>
+            <a:r>
+              <a:rPr lang="en-US" dirty="0" err="1"/>
+              <a:t>hashCode</a:t>
+            </a:r>
+            <a:r>
+              <a:rPr lang="en-US" dirty="0"/>
+              <a:t> method__</a:t>
+            </a:r>
+          </a:p>
+          <a:p>
+            <a:endParaRPr lang="en-US" dirty="0"/>
+          </a:p>
+          <a:p>
+            <a:r>
+              <a:rPr lang="en-US" dirty="0"/>
+              <a:t>What we see is a more or less conventional and standard equals() method. It returns true if the two objects are the same or if the two object are instances of the exactly same class or the other class is a subclass of our class and the fields are equal. In case of primitives the equality is checked using the equal operator, in case of objects the equality is checked calling the equals method.</a:t>
+            </a:r>
+          </a:p>
+          <a:p>
+            <a:endParaRPr lang="en-US" dirty="0"/>
+          </a:p>
+          <a:p>
+            <a:r>
+              <a:rPr lang="en-US" dirty="0"/>
+              <a:t>What we have to notice here is that the method can access all the fields on the 'this' instance but also on the 'that' instance. Even in case of private fields, the access is not forbidden, and it is not restricted to the same object.</a:t>
+            </a:r>
+          </a:p>
+          <a:p>
+            <a:endParaRPr lang="en-US" dirty="0"/>
+          </a:p>
+          <a:p>
+            <a:endParaRPr lang="en-US" dirty="0"/>
+          </a:p>
+        </p:txBody>
+      </p:sp>
+      <p:sp>
+        <p:nvSpPr>
+          <p:cNvPr id="4" name="Slide Number Placeholder 3"/>
+          <p:cNvSpPr>
+            <a:spLocks noGrp="1"/>
+          </p:cNvSpPr>
+          <p:nvPr>
+            <p:ph type="sldNum" sz="quarter" idx="5"/>
+          </p:nvPr>
+        </p:nvSpPr>
+        <p:spPr/>
+        <p:txBody>
+          <a:bodyPr/>
+          <a:lstStyle/>
+          <a:p>
+            <a:fld id="{B9060E7B-CE45-A543-B30C-07FF408185A6}" type="slidenum">
+              <a:rPr lang="en-US" smtClean="0"/>
+              <a:t>12</a:t>
+            </a:fld>
+            <a:endParaRPr lang="en-US"/>
+          </a:p>
+        </p:txBody>
+      </p:sp>
+    </p:spTree>
+    <p:extLst>
+      <p:ext uri="{BB962C8B-B14F-4D97-AF65-F5344CB8AC3E}">
+        <p14:creationId xmlns:p14="http://schemas.microsoft.com/office/powerpoint/2010/main" val="1436650043"/>
+      </p:ext>
+    </p:extLst>
+  </p:cSld>
+  <p:clrMapOvr>
+    <a:masterClrMapping/>
+  </p:clrMapOvr>
+</p:notes>
+</file>
+
+<file path=ppt/notesSlides/notesSlide13.xml><?xml version="1.0" encoding="utf-8"?>
+<p:notes xmlns:a="http://schemas.openxmlformats.org/drawingml/2006/main" xmlns:r="http://schemas.openxmlformats.org/officeDocument/2006/relationships" xmlns:p="http://schemas.openxmlformats.org/presentationml/2006/main">
+  <p:cSld>
+    <p:spTree>
+      <p:nvGrpSpPr>
+        <p:cNvPr id="1" name=""/>
+        <p:cNvGrpSpPr/>
+        <p:nvPr/>
+      </p:nvGrpSpPr>
+      <p:grpSpPr>
+        <a:xfrm>
+          <a:off x="0" y="0"/>
+          <a:ext cx="0" cy="0"/>
+          <a:chOff x="0" y="0"/>
+          <a:chExt cx="0" cy="0"/>
+        </a:xfrm>
+      </p:grpSpPr>
+      <p:sp>
+        <p:nvSpPr>
+          <p:cNvPr id="2" name="Slide Image Placeholder 1"/>
+          <p:cNvSpPr>
+            <a:spLocks noGrp="1" noRot="1" noChangeAspect="1"/>
+          </p:cNvSpPr>
+          <p:nvPr>
+            <p:ph type="sldImg"/>
+          </p:nvPr>
+        </p:nvSpPr>
+        <p:spPr/>
+      </p:sp>
+      <p:sp>
+        <p:nvSpPr>
+          <p:cNvPr id="3" name="Notes Placeholder 2"/>
+          <p:cNvSpPr>
+            <a:spLocks noGrp="1"/>
+          </p:cNvSpPr>
+          <p:nvPr>
+            <p:ph type="body" idx="1"/>
+          </p:nvPr>
+        </p:nvSpPr>
+        <p:spPr/>
+        <p:txBody>
+          <a:bodyPr/>
+          <a:lstStyle/>
+          <a:p>
+            <a:r>
+              <a:rPr lang="en-US" dirty="0"/>
+              <a:t>When we discussed first ‘private’ we said that a private member is visible only in the same class… almost. Why is this “almost”? __CLICK__ because the Java Language Specification says something different and the case when the code accessing the field, method and so on is in the same class is only a special case.</a:t>
+            </a:r>
+          </a:p>
+          <a:p>
+            <a:r>
+              <a:rPr lang="en-US" dirty="0"/>
+              <a:t>__CLICK__ </a:t>
+            </a:r>
+          </a:p>
+          <a:p>
+            <a:endParaRPr lang="en-US" dirty="0"/>
+          </a:p>
+          <a:p>
+            <a:r>
+              <a:rPr lang="en-US" dirty="0"/>
+              <a:t>The Java Language Specification does not say that it is the same class. It says it a bit differently.</a:t>
+            </a:r>
+          </a:p>
+        </p:txBody>
+      </p:sp>
+      <p:sp>
+        <p:nvSpPr>
+          <p:cNvPr id="4" name="Slide Number Placeholder 3"/>
+          <p:cNvSpPr>
+            <a:spLocks noGrp="1"/>
+          </p:cNvSpPr>
+          <p:nvPr>
+            <p:ph type="sldNum" sz="quarter" idx="5"/>
+          </p:nvPr>
+        </p:nvSpPr>
+        <p:spPr/>
+        <p:txBody>
+          <a:bodyPr/>
+          <a:lstStyle/>
+          <a:p>
+            <a:fld id="{B9060E7B-CE45-A543-B30C-07FF408185A6}" type="slidenum">
+              <a:rPr lang="en-US" smtClean="0"/>
+              <a:t>13</a:t>
+            </a:fld>
+            <a:endParaRPr lang="en-US"/>
+          </a:p>
+        </p:txBody>
+      </p:sp>
+    </p:spTree>
+    <p:extLst>
+      <p:ext uri="{BB962C8B-B14F-4D97-AF65-F5344CB8AC3E}">
+        <p14:creationId xmlns:p14="http://schemas.microsoft.com/office/powerpoint/2010/main" val="1741368190"/>
+      </p:ext>
+    </p:extLst>
+  </p:cSld>
+  <p:clrMapOvr>
+    <a:masterClrMapping/>
+  </p:clrMapOvr>
+</p:notes>
+</file>
+
+<file path=ppt/notesSlides/notesSlide14.xml><?xml version="1.0" encoding="utf-8"?>
+<p:notes xmlns:a="http://schemas.openxmlformats.org/drawingml/2006/main" xmlns:r="http://schemas.openxmlformats.org/officeDocument/2006/relationships" xmlns:p="http://schemas.openxmlformats.org/presentationml/2006/main">
+  <p:cSld>
+    <p:spTree>
+      <p:nvGrpSpPr>
+        <p:cNvPr id="1" name=""/>
+        <p:cNvGrpSpPr/>
+        <p:nvPr/>
+      </p:nvGrpSpPr>
+      <p:grpSpPr>
+        <a:xfrm>
+          <a:off x="0" y="0"/>
+          <a:ext cx="0" cy="0"/>
+          <a:chOff x="0" y="0"/>
+          <a:chExt cx="0" cy="0"/>
+        </a:xfrm>
+      </p:grpSpPr>
+      <p:sp>
+        <p:nvSpPr>
+          <p:cNvPr id="2" name="Slide Image Placeholder 1"/>
+          <p:cNvSpPr>
+            <a:spLocks noGrp="1" noRot="1" noChangeAspect="1"/>
+          </p:cNvSpPr>
+          <p:nvPr>
+            <p:ph type="sldImg"/>
+          </p:nvPr>
+        </p:nvSpPr>
+        <p:spPr/>
+      </p:sp>
+      <p:sp>
+        <p:nvSpPr>
+          <p:cNvPr id="3" name="Notes Placeholder 2"/>
+          <p:cNvSpPr>
+            <a:spLocks noGrp="1"/>
+          </p:cNvSpPr>
+          <p:nvPr>
+            <p:ph type="body" idx="1"/>
+          </p:nvPr>
+        </p:nvSpPr>
+        <p:spPr/>
+        <p:txBody>
+          <a:bodyPr/>
+          <a:lstStyle/>
+          <a:p>
+            <a:r>
+              <a:rPr lang="en-US" dirty="0"/>
+              <a:t>You can download the Java Language Specification from the URL above and you can use the QR code with your phone, so you do not need to type in the URL. What does the Java Language Specification say on the page 176, in the example 6.6-5?</a:t>
+            </a:r>
+          </a:p>
+        </p:txBody>
+      </p:sp>
+      <p:sp>
+        <p:nvSpPr>
+          <p:cNvPr id="4" name="Slide Number Placeholder 3"/>
+          <p:cNvSpPr>
+            <a:spLocks noGrp="1"/>
+          </p:cNvSpPr>
+          <p:nvPr>
+            <p:ph type="sldNum" sz="quarter" idx="5"/>
+          </p:nvPr>
+        </p:nvSpPr>
+        <p:spPr/>
+        <p:txBody>
+          <a:bodyPr/>
+          <a:lstStyle/>
+          <a:p>
+            <a:fld id="{B9060E7B-CE45-A543-B30C-07FF408185A6}" type="slidenum">
+              <a:rPr lang="en-US" smtClean="0"/>
+              <a:t>14</a:t>
+            </a:fld>
+            <a:endParaRPr lang="en-US"/>
+          </a:p>
+        </p:txBody>
+      </p:sp>
+    </p:spTree>
+    <p:extLst>
+      <p:ext uri="{BB962C8B-B14F-4D97-AF65-F5344CB8AC3E}">
+        <p14:creationId xmlns:p14="http://schemas.microsoft.com/office/powerpoint/2010/main" val="2567882239"/>
+      </p:ext>
+    </p:extLst>
+  </p:cSld>
+  <p:clrMapOvr>
+    <a:masterClrMapping/>
+  </p:clrMapOvr>
+</p:notes>
+</file>
+
+<file path=ppt/notesSlides/notesSlide15.xml><?xml version="1.0" encoding="utf-8"?>
+<p:notes xmlns:a="http://schemas.openxmlformats.org/drawingml/2006/main" xmlns:r="http://schemas.openxmlformats.org/officeDocument/2006/relationships" xmlns:p="http://schemas.openxmlformats.org/presentationml/2006/main">
+  <p:cSld>
+    <p:spTree>
+      <p:nvGrpSpPr>
+        <p:cNvPr id="1" name=""/>
+        <p:cNvGrpSpPr/>
+        <p:nvPr/>
+      </p:nvGrpSpPr>
+      <p:grpSpPr>
+        <a:xfrm>
+          <a:off x="0" y="0"/>
+          <a:ext cx="0" cy="0"/>
+          <a:chOff x="0" y="0"/>
+          <a:chExt cx="0" cy="0"/>
+        </a:xfrm>
+      </p:grpSpPr>
+      <p:sp>
+        <p:nvSpPr>
+          <p:cNvPr id="2" name="Slide Image Placeholder 1"/>
+          <p:cNvSpPr>
+            <a:spLocks noGrp="1" noRot="1" noChangeAspect="1"/>
+          </p:cNvSpPr>
+          <p:nvPr>
+            <p:ph type="sldImg"/>
+          </p:nvPr>
+        </p:nvSpPr>
+        <p:spPr/>
+      </p:sp>
+      <p:sp>
+        <p:nvSpPr>
+          <p:cNvPr id="3" name="Notes Placeholder 2"/>
+          <p:cNvSpPr>
+            <a:spLocks noGrp="1"/>
+          </p:cNvSpPr>
+          <p:nvPr>
+            <p:ph type="body" idx="1"/>
+          </p:nvPr>
+        </p:nvSpPr>
+        <p:spPr/>
+        <p:txBody>
+          <a:bodyPr/>
+          <a:lstStyle/>
+          <a:p>
+            <a:r>
+              <a:rPr lang="en-US" dirty="0"/>
+              <a:t>It says that private class members, in other words methods, fields, inner classes, inner interfaces, inner </a:t>
+            </a:r>
+            <a:r>
+              <a:rPr lang="en-US" dirty="0" err="1"/>
+              <a:t>enums</a:t>
+            </a:r>
+            <a:r>
+              <a:rPr lang="en-US" dirty="0"/>
+              <a:t> and in addition to the members the private constructors, so essentially everything that can be declared private and can happen to be inside a class are accessible if the code calling, or accessing the private member is in the same top level class as the member itself.</a:t>
+            </a:r>
+          </a:p>
+          <a:p>
+            <a:endParaRPr lang="en-US" dirty="0"/>
+          </a:p>
+          <a:p>
+            <a:r>
+              <a:rPr lang="en-US" dirty="0"/>
+              <a:t>__CLICK__</a:t>
+            </a:r>
+          </a:p>
+          <a:p>
+            <a:endParaRPr lang="en-US" dirty="0"/>
+          </a:p>
+          <a:p>
+            <a:r>
+              <a:rPr lang="en-US" dirty="0"/>
+              <a:t>Either or both the code accessing the member and the member itself can be in an inner class or interface or </a:t>
+            </a:r>
+            <a:r>
+              <a:rPr lang="en-US" dirty="0" err="1"/>
+              <a:t>enum</a:t>
+            </a:r>
+            <a:r>
+              <a:rPr lang="en-US" dirty="0"/>
+              <a:t>, the private members are accessible if they are in the same top-level class. In other words private is visible from the same source file.</a:t>
+            </a:r>
+          </a:p>
+        </p:txBody>
+      </p:sp>
+      <p:sp>
+        <p:nvSpPr>
+          <p:cNvPr id="4" name="Slide Number Placeholder 3"/>
+          <p:cNvSpPr>
+            <a:spLocks noGrp="1"/>
+          </p:cNvSpPr>
+          <p:nvPr>
+            <p:ph type="sldNum" sz="quarter" idx="5"/>
+          </p:nvPr>
+        </p:nvSpPr>
+        <p:spPr/>
+        <p:txBody>
+          <a:bodyPr/>
+          <a:lstStyle/>
+          <a:p>
+            <a:fld id="{B9060E7B-CE45-A543-B30C-07FF408185A6}" type="slidenum">
+              <a:rPr lang="en-US" smtClean="0"/>
+              <a:t>15</a:t>
+            </a:fld>
+            <a:endParaRPr lang="en-US"/>
+          </a:p>
+        </p:txBody>
+      </p:sp>
+    </p:spTree>
+    <p:extLst>
+      <p:ext uri="{BB962C8B-B14F-4D97-AF65-F5344CB8AC3E}">
+        <p14:creationId xmlns:p14="http://schemas.microsoft.com/office/powerpoint/2010/main" val="3762636270"/>
+      </p:ext>
+    </p:extLst>
+  </p:cSld>
+  <p:clrMapOvr>
+    <a:masterClrMapping/>
+  </p:clrMapOvr>
+</p:notes>
+</file>
+
+<file path=ppt/notesSlides/notesSlide16.xml><?xml version="1.0" encoding="utf-8"?>
+<p:notes xmlns:a="http://schemas.openxmlformats.org/drawingml/2006/main" xmlns:r="http://schemas.openxmlformats.org/officeDocument/2006/relationships" xmlns:p="http://schemas.openxmlformats.org/presentationml/2006/main">
+  <p:cSld>
+    <p:spTree>
+      <p:nvGrpSpPr>
+        <p:cNvPr id="1" name=""/>
+        <p:cNvGrpSpPr/>
+        <p:nvPr/>
+      </p:nvGrpSpPr>
+      <p:grpSpPr>
+        <a:xfrm>
+          <a:off x="0" y="0"/>
+          <a:ext cx="0" cy="0"/>
+          <a:chOff x="0" y="0"/>
+          <a:chExt cx="0" cy="0"/>
+        </a:xfrm>
+      </p:grpSpPr>
+      <p:sp>
+        <p:nvSpPr>
+          <p:cNvPr id="2" name="Slide Image Placeholder 1"/>
+          <p:cNvSpPr>
+            <a:spLocks noGrp="1" noRot="1" noChangeAspect="1"/>
+          </p:cNvSpPr>
+          <p:nvPr>
+            <p:ph type="sldImg"/>
+          </p:nvPr>
+        </p:nvSpPr>
+        <p:spPr/>
+      </p:sp>
+      <p:sp>
+        <p:nvSpPr>
+          <p:cNvPr id="3" name="Notes Placeholder 2"/>
+          <p:cNvSpPr>
+            <a:spLocks noGrp="1"/>
+          </p:cNvSpPr>
+          <p:nvPr>
+            <p:ph type="body" idx="1"/>
+          </p:nvPr>
+        </p:nvSpPr>
+        <p:spPr/>
+        <p:txBody>
+          <a:bodyPr/>
+          <a:lstStyle/>
+          <a:p>
+            <a:r>
+              <a:rPr lang="en-US" dirty="0"/>
+              <a:t>This is depicted on this rudimentary picture. Such an access makes sense. When the developer edits a Java source file they edit something that has high cohesion. These things belong together. If they do not belong together they should not be in the same file. But if they belong together there is no reason to hide anything using access control inside one single source file.</a:t>
+            </a:r>
+          </a:p>
+        </p:txBody>
+      </p:sp>
+      <p:sp>
+        <p:nvSpPr>
+          <p:cNvPr id="4" name="Slide Number Placeholder 3"/>
+          <p:cNvSpPr>
+            <a:spLocks noGrp="1"/>
+          </p:cNvSpPr>
+          <p:nvPr>
+            <p:ph type="sldNum" sz="quarter" idx="5"/>
+          </p:nvPr>
+        </p:nvSpPr>
+        <p:spPr/>
+        <p:txBody>
+          <a:bodyPr/>
+          <a:lstStyle/>
+          <a:p>
+            <a:fld id="{B9060E7B-CE45-A543-B30C-07FF408185A6}" type="slidenum">
+              <a:rPr lang="en-US" smtClean="0"/>
+              <a:t>16</a:t>
+            </a:fld>
+            <a:endParaRPr lang="en-US"/>
+          </a:p>
+        </p:txBody>
+      </p:sp>
+    </p:spTree>
+    <p:extLst>
+      <p:ext uri="{BB962C8B-B14F-4D97-AF65-F5344CB8AC3E}">
+        <p14:creationId xmlns:p14="http://schemas.microsoft.com/office/powerpoint/2010/main" val="1660266552"/>
+      </p:ext>
+    </p:extLst>
+  </p:cSld>
+  <p:clrMapOvr>
+    <a:masterClrMapping/>
+  </p:clrMapOvr>
+</p:notes>
+</file>
+
+<file path=ppt/notesSlides/notesSlide17.xml><?xml version="1.0" encoding="utf-8"?>
+<p:notes xmlns:a="http://schemas.openxmlformats.org/drawingml/2006/main" xmlns:r="http://schemas.openxmlformats.org/officeDocument/2006/relationships" xmlns:p="http://schemas.openxmlformats.org/presentationml/2006/main">
+  <p:cSld>
+    <p:spTree>
+      <p:nvGrpSpPr>
+        <p:cNvPr id="1" name=""/>
+        <p:cNvGrpSpPr/>
+        <p:nvPr/>
+      </p:nvGrpSpPr>
+      <p:grpSpPr>
+        <a:xfrm>
+          <a:off x="0" y="0"/>
+          <a:ext cx="0" cy="0"/>
+          <a:chOff x="0" y="0"/>
+          <a:chExt cx="0" cy="0"/>
+        </a:xfrm>
+      </p:grpSpPr>
+      <p:sp>
+        <p:nvSpPr>
+          <p:cNvPr id="2" name="Slide Image Placeholder 1"/>
+          <p:cNvSpPr>
+            <a:spLocks noGrp="1" noRot="1" noChangeAspect="1"/>
+          </p:cNvSpPr>
+          <p:nvPr>
+            <p:ph type="sldImg"/>
+          </p:nvPr>
+        </p:nvSpPr>
+        <p:spPr/>
+      </p:sp>
+      <p:sp>
+        <p:nvSpPr>
+          <p:cNvPr id="3" name="Notes Placeholder 2"/>
+          <p:cNvSpPr>
+            <a:spLocks noGrp="1"/>
+          </p:cNvSpPr>
+          <p:nvPr>
+            <p:ph type="body" idx="1"/>
+          </p:nvPr>
+        </p:nvSpPr>
+        <p:spPr/>
+        <p:txBody>
+          <a:bodyPr/>
+          <a:lstStyle/>
+          <a:p>
+            <a:r>
+              <a:rPr lang="en-US" dirty="0"/>
+              <a:t>__CHECKOUT compound class demo__</a:t>
+            </a:r>
+          </a:p>
+          <a:p>
+            <a:endParaRPr lang="en-US" dirty="0"/>
+          </a:p>
+          <a:p>
+            <a:r>
+              <a:rPr lang="en-US" dirty="0"/>
+              <a:t>In this demo we have a top level class that contains two inner classes out of one also contains a third inner class. All the methods are private and all the four classes that we have in this single source file have a public static void main method that calls all the private methods and they just print out </a:t>
+            </a:r>
+          </a:p>
+          <a:p>
+            <a:endParaRPr lang="en-US" dirty="0"/>
+          </a:p>
+          <a:p>
+            <a:r>
+              <a:rPr lang="en-US" dirty="0"/>
+              <a:t>method top</a:t>
+            </a:r>
+          </a:p>
+          <a:p>
+            <a:r>
+              <a:rPr lang="en-US" dirty="0"/>
+              <a:t>method Inner1</a:t>
+            </a:r>
+          </a:p>
+          <a:p>
+            <a:r>
+              <a:rPr lang="en-US" dirty="0"/>
+              <a:t>method Inner2</a:t>
+            </a:r>
+          </a:p>
+          <a:p>
+            <a:r>
+              <a:rPr lang="en-US" dirty="0"/>
+              <a:t>method </a:t>
+            </a:r>
+            <a:r>
+              <a:rPr lang="en-US" dirty="0" err="1"/>
+              <a:t>InnerInner</a:t>
+            </a:r>
+            <a:endParaRPr lang="en-US" dirty="0"/>
+          </a:p>
+          <a:p>
+            <a:endParaRPr lang="en-US" dirty="0"/>
+          </a:p>
+          <a:p>
+            <a:r>
+              <a:rPr lang="en-US" dirty="0"/>
+              <a:t>and they have no problem calling these method just from any class any level.</a:t>
+            </a:r>
+          </a:p>
+        </p:txBody>
+      </p:sp>
+      <p:sp>
+        <p:nvSpPr>
+          <p:cNvPr id="4" name="Slide Number Placeholder 3"/>
+          <p:cNvSpPr>
+            <a:spLocks noGrp="1"/>
+          </p:cNvSpPr>
+          <p:nvPr>
+            <p:ph type="sldNum" sz="quarter" idx="5"/>
+          </p:nvPr>
+        </p:nvSpPr>
+        <p:spPr/>
+        <p:txBody>
+          <a:bodyPr/>
+          <a:lstStyle/>
+          <a:p>
+            <a:fld id="{B9060E7B-CE45-A543-B30C-07FF408185A6}" type="slidenum">
+              <a:rPr lang="en-US" smtClean="0"/>
+              <a:t>17</a:t>
+            </a:fld>
+            <a:endParaRPr lang="en-US"/>
+          </a:p>
+        </p:txBody>
+      </p:sp>
+    </p:spTree>
+    <p:extLst>
+      <p:ext uri="{BB962C8B-B14F-4D97-AF65-F5344CB8AC3E}">
+        <p14:creationId xmlns:p14="http://schemas.microsoft.com/office/powerpoint/2010/main" val="2168004191"/>
+      </p:ext>
+    </p:extLst>
+  </p:cSld>
+  <p:clrMapOvr>
+    <a:masterClrMapping/>
+  </p:clrMapOvr>
+</p:notes>
+</file>
+
+<file path=ppt/notesSlides/notesSlide18.xml><?xml version="1.0" encoding="utf-8"?>
+<p:notes xmlns:a="http://schemas.openxmlformats.org/drawingml/2006/main" xmlns:r="http://schemas.openxmlformats.org/officeDocument/2006/relationships" xmlns:p="http://schemas.openxmlformats.org/presentationml/2006/main">
+  <p:cSld>
+    <p:spTree>
+      <p:nvGrpSpPr>
+        <p:cNvPr id="1" name=""/>
+        <p:cNvGrpSpPr/>
+        <p:nvPr/>
+      </p:nvGrpSpPr>
+      <p:grpSpPr>
+        <a:xfrm>
+          <a:off x="0" y="0"/>
+          <a:ext cx="0" cy="0"/>
+          <a:chOff x="0" y="0"/>
+          <a:chExt cx="0" cy="0"/>
+        </a:xfrm>
+      </p:grpSpPr>
+      <p:sp>
+        <p:nvSpPr>
+          <p:cNvPr id="2" name="Slide Image Placeholder 1"/>
+          <p:cNvSpPr>
+            <a:spLocks noGrp="1" noRot="1" noChangeAspect="1"/>
+          </p:cNvSpPr>
+          <p:nvPr>
+            <p:ph type="sldImg"/>
+          </p:nvPr>
+        </p:nvSpPr>
+        <p:spPr/>
+      </p:sp>
+      <p:sp>
+        <p:nvSpPr>
+          <p:cNvPr id="3" name="Notes Placeholder 2"/>
+          <p:cNvSpPr>
+            <a:spLocks noGrp="1"/>
+          </p:cNvSpPr>
+          <p:nvPr>
+            <p:ph type="body" idx="1"/>
+          </p:nvPr>
+        </p:nvSpPr>
+        <p:spPr/>
+        <p:txBody>
+          <a:bodyPr/>
+          <a:lstStyle/>
+          <a:p>
+            <a:r>
+              <a:rPr lang="en-US" dirty="0"/>
+              <a:t>Here the “almost” is not that big of an issues, but with some Java developer position on some interviews this small thing may still make the difference between getting the job or a refusal. The statement that “the default access is package access when we are not specifying any modifier” is only true when the member is in a class. If the member is in an interface then the default is public.</a:t>
+            </a:r>
+          </a:p>
+        </p:txBody>
+      </p:sp>
+      <p:sp>
+        <p:nvSpPr>
+          <p:cNvPr id="4" name="Slide Number Placeholder 3"/>
+          <p:cNvSpPr>
+            <a:spLocks noGrp="1"/>
+          </p:cNvSpPr>
+          <p:nvPr>
+            <p:ph type="sldNum" sz="quarter" idx="5"/>
+          </p:nvPr>
+        </p:nvSpPr>
+        <p:spPr/>
+        <p:txBody>
+          <a:bodyPr/>
+          <a:lstStyle/>
+          <a:p>
+            <a:fld id="{B9060E7B-CE45-A543-B30C-07FF408185A6}" type="slidenum">
+              <a:rPr lang="en-US" smtClean="0"/>
+              <a:t>18</a:t>
+            </a:fld>
+            <a:endParaRPr lang="en-US"/>
+          </a:p>
+        </p:txBody>
+      </p:sp>
+    </p:spTree>
+    <p:extLst>
+      <p:ext uri="{BB962C8B-B14F-4D97-AF65-F5344CB8AC3E}">
+        <p14:creationId xmlns:p14="http://schemas.microsoft.com/office/powerpoint/2010/main" val="2121347817"/>
+      </p:ext>
+    </p:extLst>
+  </p:cSld>
+  <p:clrMapOvr>
+    <a:masterClrMapping/>
+  </p:clrMapOvr>
+</p:notes>
+</file>
+
+<file path=ppt/notesSlides/notesSlide19.xml><?xml version="1.0" encoding="utf-8"?>
+<p:notes xmlns:a="http://schemas.openxmlformats.org/drawingml/2006/main" xmlns:r="http://schemas.openxmlformats.org/officeDocument/2006/relationships" xmlns:p="http://schemas.openxmlformats.org/presentationml/2006/main">
+  <p:cSld>
+    <p:spTree>
+      <p:nvGrpSpPr>
+        <p:cNvPr id="1" name=""/>
+        <p:cNvGrpSpPr/>
+        <p:nvPr/>
+      </p:nvGrpSpPr>
+      <p:grpSpPr>
+        <a:xfrm>
+          <a:off x="0" y="0"/>
+          <a:ext cx="0" cy="0"/>
+          <a:chOff x="0" y="0"/>
+          <a:chExt cx="0" cy="0"/>
+        </a:xfrm>
+      </p:grpSpPr>
+      <p:sp>
+        <p:nvSpPr>
+          <p:cNvPr id="2" name="Slide Image Placeholder 1"/>
+          <p:cNvSpPr>
+            <a:spLocks noGrp="1" noRot="1" noChangeAspect="1"/>
+          </p:cNvSpPr>
+          <p:nvPr>
+            <p:ph type="sldImg"/>
+          </p:nvPr>
+        </p:nvSpPr>
+        <p:spPr/>
+      </p:sp>
+      <p:sp>
+        <p:nvSpPr>
+          <p:cNvPr id="3" name="Notes Placeholder 2"/>
+          <p:cNvSpPr>
+            <a:spLocks noGrp="1"/>
+          </p:cNvSpPr>
+          <p:nvPr>
+            <p:ph type="body" idx="1"/>
+          </p:nvPr>
+        </p:nvSpPr>
+        <p:spPr/>
+        <p:txBody>
+          <a:bodyPr/>
+          <a:lstStyle/>
+          <a:p>
+            <a:r>
+              <a:rPr lang="en-US" dirty="0"/>
+              <a:t>The “almost” in case of the protected is that a protected member is visible outside of the package only in subclasses only by code that is responsible for the implementation of that object.</a:t>
+            </a:r>
+          </a:p>
+        </p:txBody>
+      </p:sp>
+      <p:sp>
+        <p:nvSpPr>
+          <p:cNvPr id="4" name="Slide Number Placeholder 3"/>
+          <p:cNvSpPr>
+            <a:spLocks noGrp="1"/>
+          </p:cNvSpPr>
+          <p:nvPr>
+            <p:ph type="sldNum" sz="quarter" idx="5"/>
+          </p:nvPr>
+        </p:nvSpPr>
+        <p:spPr/>
+        <p:txBody>
+          <a:bodyPr/>
+          <a:lstStyle/>
+          <a:p>
+            <a:fld id="{B9060E7B-CE45-A543-B30C-07FF408185A6}" type="slidenum">
+              <a:rPr lang="en-US" smtClean="0"/>
+              <a:t>19</a:t>
+            </a:fld>
+            <a:endParaRPr lang="en-US"/>
+          </a:p>
+        </p:txBody>
+      </p:sp>
+    </p:spTree>
+    <p:extLst>
+      <p:ext uri="{BB962C8B-B14F-4D97-AF65-F5344CB8AC3E}">
+        <p14:creationId xmlns:p14="http://schemas.microsoft.com/office/powerpoint/2010/main" val="1973055343"/>
+      </p:ext>
+    </p:extLst>
+  </p:cSld>
+  <p:clrMapOvr>
+    <a:masterClrMapping/>
+  </p:clrMapOvr>
+</p:notes>
+</file>
+
 <file path=ppt/notesSlides/notesSlide2.xml><?xml version="1.0" encoding="utf-8"?>
 <p:notes xmlns:a="http://schemas.openxmlformats.org/drawingml/2006/main" xmlns:r="http://schemas.openxmlformats.org/officeDocument/2006/relationships" xmlns:p="http://schemas.openxmlformats.org/presentationml/2006/main">
   <p:cSld>
@@ -826,6 +1803,397 @@
     <p:extLst>
       <p:ext uri="{BB962C8B-B14F-4D97-AF65-F5344CB8AC3E}">
         <p14:creationId xmlns:p14="http://schemas.microsoft.com/office/powerpoint/2010/main" val="3603971547"/>
+      </p:ext>
+    </p:extLst>
+  </p:cSld>
+  <p:clrMapOvr>
+    <a:masterClrMapping/>
+  </p:clrMapOvr>
+</p:notes>
+</file>
+
+<file path=ppt/notesSlides/notesSlide20.xml><?xml version="1.0" encoding="utf-8"?>
+<p:notes xmlns:a="http://schemas.openxmlformats.org/drawingml/2006/main" xmlns:r="http://schemas.openxmlformats.org/officeDocument/2006/relationships" xmlns:p="http://schemas.openxmlformats.org/presentationml/2006/main">
+  <p:cSld>
+    <p:spTree>
+      <p:nvGrpSpPr>
+        <p:cNvPr id="1" name=""/>
+        <p:cNvGrpSpPr/>
+        <p:nvPr/>
+      </p:nvGrpSpPr>
+      <p:grpSpPr>
+        <a:xfrm>
+          <a:off x="0" y="0"/>
+          <a:ext cx="0" cy="0"/>
+          <a:chOff x="0" y="0"/>
+          <a:chExt cx="0" cy="0"/>
+        </a:xfrm>
+      </p:grpSpPr>
+      <p:sp>
+        <p:nvSpPr>
+          <p:cNvPr id="2" name="Slide Image Placeholder 1"/>
+          <p:cNvSpPr>
+            <a:spLocks noGrp="1" noRot="1" noChangeAspect="1"/>
+          </p:cNvSpPr>
+          <p:nvPr>
+            <p:ph type="sldImg"/>
+          </p:nvPr>
+        </p:nvSpPr>
+        <p:spPr/>
+      </p:sp>
+      <p:sp>
+        <p:nvSpPr>
+          <p:cNvPr id="3" name="Notes Placeholder 2"/>
+          <p:cNvSpPr>
+            <a:spLocks noGrp="1"/>
+          </p:cNvSpPr>
+          <p:nvPr>
+            <p:ph type="body" idx="1"/>
+          </p:nvPr>
+        </p:nvSpPr>
+        <p:spPr/>
+        <p:txBody>
+          <a:bodyPr/>
+          <a:lstStyle/>
+          <a:p>
+            <a:r>
+              <a:rPr lang="en-US" dirty="0"/>
+              <a:t>On the page 176 the specification says that a protected member or constructor of an object may be accessed from outside the package in which it is declared only by code that is responsible for the implementation of that object. There is a sample code on two pages later</a:t>
+            </a:r>
+          </a:p>
+        </p:txBody>
+      </p:sp>
+      <p:sp>
+        <p:nvSpPr>
+          <p:cNvPr id="4" name="Slide Number Placeholder 3"/>
+          <p:cNvSpPr>
+            <a:spLocks noGrp="1"/>
+          </p:cNvSpPr>
+          <p:nvPr>
+            <p:ph type="sldNum" sz="quarter" idx="5"/>
+          </p:nvPr>
+        </p:nvSpPr>
+        <p:spPr/>
+        <p:txBody>
+          <a:bodyPr/>
+          <a:lstStyle/>
+          <a:p>
+            <a:fld id="{B9060E7B-CE45-A543-B30C-07FF408185A6}" type="slidenum">
+              <a:rPr lang="en-US" smtClean="0"/>
+              <a:t>20</a:t>
+            </a:fld>
+            <a:endParaRPr lang="en-US"/>
+          </a:p>
+        </p:txBody>
+      </p:sp>
+    </p:spTree>
+    <p:extLst>
+      <p:ext uri="{BB962C8B-B14F-4D97-AF65-F5344CB8AC3E}">
+        <p14:creationId xmlns:p14="http://schemas.microsoft.com/office/powerpoint/2010/main" val="4010964104"/>
+      </p:ext>
+    </p:extLst>
+  </p:cSld>
+  <p:clrMapOvr>
+    <a:masterClrMapping/>
+  </p:clrMapOvr>
+</p:notes>
+</file>
+
+<file path=ppt/notesSlides/notesSlide21.xml><?xml version="1.0" encoding="utf-8"?>
+<p:notes xmlns:a="http://schemas.openxmlformats.org/drawingml/2006/main" xmlns:r="http://schemas.openxmlformats.org/officeDocument/2006/relationships" xmlns:p="http://schemas.openxmlformats.org/presentationml/2006/main">
+  <p:cSld>
+    <p:spTree>
+      <p:nvGrpSpPr>
+        <p:cNvPr id="1" name=""/>
+        <p:cNvGrpSpPr/>
+        <p:nvPr/>
+      </p:nvGrpSpPr>
+      <p:grpSpPr>
+        <a:xfrm>
+          <a:off x="0" y="0"/>
+          <a:ext cx="0" cy="0"/>
+          <a:chOff x="0" y="0"/>
+          <a:chExt cx="0" cy="0"/>
+        </a:xfrm>
+      </p:grpSpPr>
+      <p:sp>
+        <p:nvSpPr>
+          <p:cNvPr id="2" name="Slide Image Placeholder 1"/>
+          <p:cNvSpPr>
+            <a:spLocks noGrp="1" noRot="1" noChangeAspect="1"/>
+          </p:cNvSpPr>
+          <p:nvPr>
+            <p:ph type="sldImg"/>
+          </p:nvPr>
+        </p:nvSpPr>
+        <p:spPr/>
+      </p:sp>
+      <p:sp>
+        <p:nvSpPr>
+          <p:cNvPr id="3" name="Notes Placeholder 2"/>
+          <p:cNvSpPr>
+            <a:spLocks noGrp="1"/>
+          </p:cNvSpPr>
+          <p:nvPr>
+            <p:ph type="body" idx="1"/>
+          </p:nvPr>
+        </p:nvSpPr>
+        <p:spPr/>
+        <p:txBody>
+          <a:bodyPr/>
+          <a:lstStyle/>
+          <a:p>
+            <a:r>
+              <a:rPr lang="en-US" dirty="0"/>
+              <a:t>__WAIT A FEW SECONDS AND THEN WE SWITCH TO THE DEMO OF THE SAME CLASSES __</a:t>
+            </a:r>
+          </a:p>
+        </p:txBody>
+      </p:sp>
+      <p:sp>
+        <p:nvSpPr>
+          <p:cNvPr id="4" name="Slide Number Placeholder 3"/>
+          <p:cNvSpPr>
+            <a:spLocks noGrp="1"/>
+          </p:cNvSpPr>
+          <p:nvPr>
+            <p:ph type="sldNum" sz="quarter" idx="5"/>
+          </p:nvPr>
+        </p:nvSpPr>
+        <p:spPr/>
+        <p:txBody>
+          <a:bodyPr/>
+          <a:lstStyle/>
+          <a:p>
+            <a:fld id="{B9060E7B-CE45-A543-B30C-07FF408185A6}" type="slidenum">
+              <a:rPr lang="en-US" smtClean="0"/>
+              <a:t>21</a:t>
+            </a:fld>
+            <a:endParaRPr lang="en-US"/>
+          </a:p>
+        </p:txBody>
+      </p:sp>
+    </p:spTree>
+    <p:extLst>
+      <p:ext uri="{BB962C8B-B14F-4D97-AF65-F5344CB8AC3E}">
+        <p14:creationId xmlns:p14="http://schemas.microsoft.com/office/powerpoint/2010/main" val="32139065"/>
+      </p:ext>
+    </p:extLst>
+  </p:cSld>
+  <p:clrMapOvr>
+    <a:masterClrMapping/>
+  </p:clrMapOvr>
+</p:notes>
+</file>
+
+<file path=ppt/notesSlides/notesSlide22.xml><?xml version="1.0" encoding="utf-8"?>
+<p:notes xmlns:a="http://schemas.openxmlformats.org/drawingml/2006/main" xmlns:r="http://schemas.openxmlformats.org/officeDocument/2006/relationships" xmlns:p="http://schemas.openxmlformats.org/presentationml/2006/main">
+  <p:cSld>
+    <p:spTree>
+      <p:nvGrpSpPr>
+        <p:cNvPr id="1" name=""/>
+        <p:cNvGrpSpPr/>
+        <p:nvPr/>
+      </p:nvGrpSpPr>
+      <p:grpSpPr>
+        <a:xfrm>
+          <a:off x="0" y="0"/>
+          <a:ext cx="0" cy="0"/>
+          <a:chOff x="0" y="0"/>
+          <a:chExt cx="0" cy="0"/>
+        </a:xfrm>
+      </p:grpSpPr>
+      <p:sp>
+        <p:nvSpPr>
+          <p:cNvPr id="2" name="Slide Image Placeholder 1"/>
+          <p:cNvSpPr>
+            <a:spLocks noGrp="1" noRot="1" noChangeAspect="1"/>
+          </p:cNvSpPr>
+          <p:nvPr>
+            <p:ph type="sldImg"/>
+          </p:nvPr>
+        </p:nvSpPr>
+        <p:spPr/>
+      </p:sp>
+      <p:sp>
+        <p:nvSpPr>
+          <p:cNvPr id="3" name="Notes Placeholder 2"/>
+          <p:cNvSpPr>
+            <a:spLocks noGrp="1"/>
+          </p:cNvSpPr>
+          <p:nvPr>
+            <p:ph type="body" idx="1"/>
+          </p:nvPr>
+        </p:nvSpPr>
+        <p:spPr/>
+        <p:txBody>
+          <a:bodyPr/>
+          <a:lstStyle/>
+          <a:p>
+            <a:r>
+              <a:rPr lang="en-US" dirty="0"/>
+              <a:t>__ CLOSE ALL EDITOR FILES__</a:t>
+            </a:r>
+          </a:p>
+          <a:p>
+            <a:endParaRPr lang="en-US" dirty="0"/>
+          </a:p>
+          <a:p>
+            <a:r>
+              <a:rPr lang="en-US" dirty="0"/>
+              <a:t>In the demo project we have reproduced this example. We have the packages "points" and "</a:t>
+            </a:r>
+            <a:r>
+              <a:rPr lang="en-US" dirty="0" err="1"/>
+              <a:t>threePoints</a:t>
+            </a:r>
+            <a:r>
+              <a:rPr lang="en-US" dirty="0"/>
+              <a:t>" and the classes "Point" and "Point3d".</a:t>
+            </a:r>
+          </a:p>
+          <a:p>
+            <a:endParaRPr lang="en-US" dirty="0"/>
+          </a:p>
+          <a:p>
+            <a:r>
+              <a:rPr lang="en-US" dirty="0"/>
+              <a:t>Point3d extends the parent class Point. In this the method 'delta()' cannot access the protected members 'x' and 'y' of the parameter 'p' because this code is not involved in the implementation of Point.</a:t>
+            </a:r>
+          </a:p>
+          <a:p>
+            <a:endParaRPr lang="en-US" dirty="0"/>
+          </a:p>
+          <a:p>
+            <a:r>
+              <a:rPr lang="en-US" dirty="0"/>
+              <a:t>The method delta3d can access the protected members of its parameter q, because the class Point3d is a subclass of Point and is involved in the implementation of a Point3d.</a:t>
+            </a:r>
+          </a:p>
+          <a:p>
+            <a:endParaRPr lang="en-US" dirty="0"/>
+          </a:p>
+          <a:p>
+            <a:r>
+              <a:rPr lang="en-US" dirty="0"/>
+              <a:t>__CLOSE THESE TWO EDITOR FILES__</a:t>
+            </a:r>
+          </a:p>
+          <a:p>
+            <a:r>
+              <a:rPr lang="en-US" dirty="0"/>
+              <a:t>__OPEN </a:t>
+            </a:r>
+            <a:r>
+              <a:rPr lang="en-US" dirty="0" err="1"/>
+              <a:t>ClassA</a:t>
+            </a:r>
+            <a:r>
+              <a:rPr lang="en-US" dirty="0"/>
+              <a:t> and </a:t>
+            </a:r>
+            <a:r>
+              <a:rPr lang="en-US" dirty="0" err="1"/>
+              <a:t>ClassExtendsClassA</a:t>
+            </a:r>
+            <a:r>
+              <a:rPr lang="en-US" dirty="0"/>
+              <a:t>__</a:t>
+            </a:r>
+          </a:p>
+          <a:p>
+            <a:endParaRPr lang="en-US" dirty="0"/>
+          </a:p>
+          <a:p>
+            <a:r>
+              <a:rPr lang="en-US" dirty="0"/>
+              <a:t>We have already seen the main method in this class. The </a:t>
+            </a:r>
+            <a:r>
+              <a:rPr lang="en-US" dirty="0" err="1"/>
+              <a:t>inhertited</a:t>
+            </a:r>
+            <a:r>
+              <a:rPr lang="en-US" dirty="0"/>
+              <a:t> protected method can be called as well as the public method. Now let's have a look at the </a:t>
+            </a:r>
+            <a:r>
+              <a:rPr lang="en-US" dirty="0" err="1"/>
+              <a:t>callerMethod</a:t>
+            </a:r>
+            <a:r>
+              <a:rPr lang="en-US" dirty="0"/>
+              <a:t>(). Here we have an instance of </a:t>
+            </a:r>
+            <a:r>
+              <a:rPr lang="en-US" dirty="0" err="1"/>
+              <a:t>ClassA</a:t>
+            </a:r>
+            <a:r>
+              <a:rPr lang="en-US" dirty="0"/>
+              <a:t>. Because the </a:t>
+            </a:r>
+            <a:r>
+              <a:rPr lang="en-US" dirty="0" err="1"/>
+              <a:t>callerMethod</a:t>
+            </a:r>
+            <a:r>
+              <a:rPr lang="en-US" dirty="0"/>
+              <a:t> is not part of the implementation of </a:t>
+            </a:r>
+            <a:r>
+              <a:rPr lang="en-US" dirty="0" err="1"/>
+              <a:t>ClassA</a:t>
+            </a:r>
+            <a:r>
+              <a:rPr lang="en-US" dirty="0"/>
+              <a:t>, it is only part of the implementation of a subclass, thus it cannot call the protected method on this instance.</a:t>
+            </a:r>
+          </a:p>
+          <a:p>
+            <a:endParaRPr lang="en-US" dirty="0"/>
+          </a:p>
+          <a:p>
+            <a:r>
+              <a:rPr lang="en-US" dirty="0"/>
+              <a:t>__UNCOMMENT sut1.protectedMethod()  CALL__</a:t>
+            </a:r>
+          </a:p>
+          <a:p>
+            <a:endParaRPr lang="en-US" dirty="0"/>
+          </a:p>
+          <a:p>
+            <a:endParaRPr lang="en-US" dirty="0"/>
+          </a:p>
+        </p:txBody>
+      </p:sp>
+      <p:sp>
+        <p:nvSpPr>
+          <p:cNvPr id="4" name="Slide Number Placeholder 3"/>
+          <p:cNvSpPr>
+            <a:spLocks noGrp="1"/>
+          </p:cNvSpPr>
+          <p:nvPr>
+            <p:ph type="sldNum" sz="quarter" idx="5"/>
+          </p:nvPr>
+        </p:nvSpPr>
+        <p:spPr/>
+        <p:txBody>
+          <a:bodyPr/>
+          <a:lstStyle/>
+          <a:p>
+            <a:fld id="{B9060E7B-CE45-A543-B30C-07FF408185A6}" type="slidenum">
+              <a:rPr lang="en-US" smtClean="0"/>
+              <a:t>22</a:t>
+            </a:fld>
+            <a:endParaRPr lang="en-US"/>
+          </a:p>
+        </p:txBody>
+      </p:sp>
+    </p:spTree>
+    <p:extLst>
+      <p:ext uri="{BB962C8B-B14F-4D97-AF65-F5344CB8AC3E}">
+        <p14:creationId xmlns:p14="http://schemas.microsoft.com/office/powerpoint/2010/main" val="1278322407"/>
       </p:ext>
     </p:extLst>
   </p:cSld>
@@ -881,7 +2249,7 @@
           <a:p>
             <a:r>
               <a:rPr lang="en-US" dirty="0"/>
-              <a:t>.. there are four access levels in Java. These are __CLICK__ private __CLCK__ package private, when we do not use any access modifier keyword in front of the member declaration __CLICK__ protected and __CLICK__ public. What are the access levels?</a:t>
+              <a:t>.. there are four access levels in Java. These are __CLICK__ private __CLCK__ package access, when we do not use any access modifier keyword in front of the member declaration __CLICK__ protected and __CLICK__ public. What are the access levels?</a:t>
             </a:r>
           </a:p>
         </p:txBody>
@@ -1400,6 +2768,305 @@
         <p:txBody>
           <a:bodyPr/>
           <a:lstStyle/>
+          <a:p>
+            <a:r>
+              <a:rPr lang="en-US" dirty="0"/>
+              <a:t>__ checkout access-modifiers-simple-demo __</a:t>
+            </a:r>
+          </a:p>
+          <a:p>
+            <a:endParaRPr lang="en-US" dirty="0"/>
+          </a:p>
+          <a:p>
+            <a:r>
+              <a:rPr lang="en-US" dirty="0"/>
+              <a:t>I this demo we have a few classes in two packages. There is a package a and a package b under javax0.blog.demo.accessmodifiers</a:t>
+            </a:r>
+          </a:p>
+          <a:p>
+            <a:endParaRPr lang="en-US" dirty="0"/>
+          </a:p>
+          <a:p>
+            <a:r>
+              <a:rPr lang="en-US" dirty="0" err="1"/>
+              <a:t>ClassA</a:t>
+            </a:r>
+            <a:r>
+              <a:rPr lang="en-US" dirty="0"/>
+              <a:t> __OPEN CLASS A__ defines four methods. One private, one package access, many times referred to as package private or default, a protected and a public. There is also a main that calls these methods.</a:t>
+            </a:r>
+          </a:p>
+          <a:p>
+            <a:endParaRPr lang="en-US" dirty="0"/>
+          </a:p>
+          <a:p>
+            <a:r>
+              <a:rPr lang="en-US" dirty="0"/>
+              <a:t>We also have a class </a:t>
+            </a:r>
+            <a:r>
+              <a:rPr lang="en-US" dirty="0" err="1"/>
+              <a:t>MainCallingClassAMethods</a:t>
+            </a:r>
+            <a:r>
+              <a:rPr lang="en-US" dirty="0"/>
+              <a:t> __OPEN THE FILE__ that also contains a main with the same code trying to call the same methods. In this file there is an error as signaled by the IDE. The private method cannot be invoked because this code is in a different top-level class and therefore it cannot access the private method, which is in a different top-level class. </a:t>
+            </a:r>
+          </a:p>
+          <a:p>
+            <a:endParaRPr lang="en-US" dirty="0"/>
+          </a:p>
+          <a:p>
+            <a:r>
+              <a:rPr lang="en-US" dirty="0"/>
+              <a:t>__ comment out the error line __</a:t>
+            </a:r>
+          </a:p>
+          <a:p>
+            <a:endParaRPr lang="en-US" dirty="0"/>
+          </a:p>
+          <a:p>
+            <a:r>
+              <a:rPr lang="en-US" dirty="0"/>
+              <a:t>We also have a class named </a:t>
+            </a:r>
+            <a:r>
+              <a:rPr lang="en-US" dirty="0" err="1"/>
+              <a:t>MainExtendingClassACallingClassAMethods</a:t>
+            </a:r>
+            <a:r>
+              <a:rPr lang="en-US" dirty="0"/>
+              <a:t> which is the same as the previous one, but this one is extending the original class, </a:t>
+            </a:r>
+            <a:r>
+              <a:rPr lang="en-US" dirty="0" err="1"/>
+              <a:t>ClassA</a:t>
+            </a:r>
+            <a:r>
+              <a:rPr lang="en-US" dirty="0"/>
+              <a:t>. There is no surprise, we are in the same package but in a different class, we can call any method except the private one.</a:t>
+            </a:r>
+          </a:p>
+          <a:p>
+            <a:endParaRPr lang="en-US" dirty="0"/>
+          </a:p>
+          <a:p>
+            <a:r>
+              <a:rPr lang="en-US" dirty="0"/>
+              <a:t>__ comment out the error line __</a:t>
+            </a:r>
+          </a:p>
+          <a:p>
+            <a:endParaRPr lang="en-US" dirty="0"/>
+          </a:p>
+          <a:p>
+            <a:r>
+              <a:rPr lang="en-US" dirty="0"/>
+              <a:t>We also have a </a:t>
+            </a:r>
+            <a:r>
+              <a:rPr lang="en-US" dirty="0" err="1"/>
+              <a:t>ClassB</a:t>
+            </a:r>
+            <a:r>
+              <a:rPr lang="en-US" dirty="0"/>
+              <a:t>, which is in the package B. We, again, try to call the methods from here. We can call from here only the public method.</a:t>
+            </a:r>
+          </a:p>
+          <a:p>
+            <a:endParaRPr lang="en-US" dirty="0"/>
+          </a:p>
+          <a:p>
+            <a:r>
+              <a:rPr lang="en-US" dirty="0"/>
+              <a:t>__ comment out the error lines all __</a:t>
+            </a:r>
+          </a:p>
+          <a:p>
+            <a:endParaRPr lang="en-US" dirty="0"/>
+          </a:p>
+          <a:p>
+            <a:r>
+              <a:rPr lang="en-US" dirty="0"/>
+              <a:t>Finally we have a class </a:t>
+            </a:r>
+            <a:r>
+              <a:rPr lang="en-US" dirty="0" err="1"/>
+              <a:t>ClassExtendsClassA</a:t>
+            </a:r>
+            <a:r>
+              <a:rPr lang="en-US" dirty="0"/>
+              <a:t> that is in the package B but it extends the class A. In this case, because we extend the class </a:t>
+            </a:r>
+            <a:r>
+              <a:rPr lang="en-US" dirty="0" err="1"/>
+              <a:t>ClassA</a:t>
+            </a:r>
+            <a:r>
+              <a:rPr lang="en-US" dirty="0"/>
+              <a:t> we can call the protected method as well. However, be warned that this is a simple case, we will see later that this is not that simple. Nevertheless the code above works after commenting out the error lines.</a:t>
+            </a:r>
+          </a:p>
+          <a:p>
+            <a:endParaRPr lang="en-US" dirty="0"/>
+          </a:p>
+          <a:p>
+            <a:r>
+              <a:rPr lang="en-US" dirty="0"/>
+              <a:t>__ comment out the error lines all __</a:t>
+            </a:r>
+          </a:p>
+          <a:p>
+            <a:endParaRPr lang="en-US" dirty="0"/>
+          </a:p>
+          <a:p>
+            <a:r>
+              <a:rPr lang="en-US" dirty="0"/>
+              <a:t>Now we can start the main methods one after the other and see that the methods are really invoked.</a:t>
+            </a:r>
+          </a:p>
+          <a:p>
+            <a:endParaRPr lang="en-US" dirty="0"/>
+          </a:p>
+          <a:p>
+            <a:r>
+              <a:rPr lang="en-US" dirty="0"/>
+              <a:t>__RUN </a:t>
+            </a:r>
+            <a:r>
+              <a:rPr lang="en-US" dirty="0" err="1"/>
+              <a:t>ClassA.main</a:t>
+            </a:r>
+            <a:r>
+              <a:rPr lang="en-US" dirty="0"/>
+              <a:t>() __</a:t>
+            </a:r>
+          </a:p>
+          <a:p>
+            <a:endParaRPr lang="en-US" dirty="0"/>
+          </a:p>
+          <a:p>
+            <a:r>
+              <a:rPr lang="en-US" dirty="0"/>
+              <a:t>When we run the local main method, which is in the same class where out methods are then the output shows that all the methods were invoked.</a:t>
+            </a:r>
+          </a:p>
+          <a:p>
+            <a:endParaRPr lang="en-US" dirty="0"/>
+          </a:p>
+          <a:p>
+            <a:r>
+              <a:rPr lang="en-US" dirty="0"/>
+              <a:t>__RUN </a:t>
+            </a:r>
+            <a:r>
+              <a:rPr lang="en-US" dirty="0" err="1"/>
+              <a:t>MainCallingClassAMethods.main</a:t>
+            </a:r>
+            <a:r>
+              <a:rPr lang="en-US" dirty="0"/>
+              <a:t>() __</a:t>
+            </a:r>
+          </a:p>
+          <a:p>
+            <a:endParaRPr lang="en-US" dirty="0"/>
+          </a:p>
+          <a:p>
+            <a:r>
+              <a:rPr lang="en-US" dirty="0"/>
+              <a:t>When we run the main method from the other class then only the private method, that we had to comment out is not invoked.</a:t>
+            </a:r>
+          </a:p>
+          <a:p>
+            <a:endParaRPr lang="en-US" dirty="0"/>
+          </a:p>
+          <a:p>
+            <a:r>
+              <a:rPr lang="en-US" dirty="0"/>
+              <a:t>__RUN </a:t>
+            </a:r>
+            <a:r>
+              <a:rPr lang="en-US" dirty="0" err="1"/>
+              <a:t>MainExtendingClassACallingClassAMethods.main</a:t>
+            </a:r>
+            <a:r>
+              <a:rPr lang="en-US" dirty="0"/>
+              <a:t>()__</a:t>
+            </a:r>
+          </a:p>
+          <a:p>
+            <a:endParaRPr lang="en-US" dirty="0"/>
+          </a:p>
+          <a:p>
+            <a:r>
+              <a:rPr lang="en-US" dirty="0"/>
+              <a:t>When we run the main method from the other class that extends the original class then we get the same result.</a:t>
+            </a:r>
+          </a:p>
+          <a:p>
+            <a:endParaRPr lang="en-US" dirty="0"/>
+          </a:p>
+          <a:p>
+            <a:r>
+              <a:rPr lang="en-US" dirty="0"/>
+              <a:t>__RUN </a:t>
+            </a:r>
+            <a:r>
+              <a:rPr lang="en-US" dirty="0" err="1"/>
+              <a:t>ClassB.main</a:t>
+            </a:r>
+            <a:r>
+              <a:rPr lang="en-US" dirty="0"/>
+              <a:t>()__</a:t>
+            </a:r>
+          </a:p>
+          <a:p>
+            <a:endParaRPr lang="en-US" dirty="0"/>
+          </a:p>
+          <a:p>
+            <a:r>
+              <a:rPr lang="en-US" dirty="0"/>
+              <a:t>Running the main method of the class in the other package we can only invoke the public method.</a:t>
+            </a:r>
+          </a:p>
+          <a:p>
+            <a:endParaRPr lang="en-US" dirty="0"/>
+          </a:p>
+          <a:p>
+            <a:r>
+              <a:rPr lang="en-US" dirty="0"/>
+              <a:t>__RUN </a:t>
+            </a:r>
+            <a:r>
+              <a:rPr lang="en-US" dirty="0" err="1"/>
+              <a:t>ClassExtendsClassA.main</a:t>
+            </a:r>
+            <a:r>
+              <a:rPr lang="en-US" dirty="0"/>
+              <a:t>()__</a:t>
+            </a:r>
+          </a:p>
+          <a:p>
+            <a:endParaRPr lang="en-US" dirty="0"/>
+          </a:p>
+          <a:p>
+            <a:r>
+              <a:rPr lang="en-US" dirty="0"/>
+              <a:t>Finally running the main method of the class that is in the other package but extends the original class we can invoke the public method and also the protected method.</a:t>
+            </a:r>
+          </a:p>
+          <a:p>
+            <a:endParaRPr lang="en-US" dirty="0"/>
+          </a:p>
+          <a:p>
+            <a:endParaRPr lang="en-US" dirty="0"/>
+          </a:p>
+          <a:p>
+            <a:endParaRPr lang="en-US" dirty="0"/>
+          </a:p>
+          <a:p>
+            <a:endParaRPr lang="en-US" dirty="0"/>
+          </a:p>
           <a:p>
             <a:endParaRPr lang="en-US" dirty="0"/>
           </a:p>
@@ -5229,6 +6896,2184 @@
 </p:sld>
 </file>
 
+<file path=ppt/slides/slide12.xml><?xml version="1.0" encoding="utf-8"?>
+<p:sld xmlns:a="http://schemas.openxmlformats.org/drawingml/2006/main" xmlns:r="http://schemas.openxmlformats.org/officeDocument/2006/relationships" xmlns:p="http://schemas.openxmlformats.org/presentationml/2006/main">
+  <p:cSld>
+    <p:spTree>
+      <p:nvGrpSpPr>
+        <p:cNvPr id="1" name=""/>
+        <p:cNvGrpSpPr/>
+        <p:nvPr/>
+      </p:nvGrpSpPr>
+      <p:grpSpPr>
+        <a:xfrm>
+          <a:off x="0" y="0"/>
+          <a:ext cx="0" cy="0"/>
+          <a:chOff x="0" y="0"/>
+          <a:chExt cx="0" cy="0"/>
+        </a:xfrm>
+      </p:grpSpPr>
+      <p:sp>
+        <p:nvSpPr>
+          <p:cNvPr id="2" name="Title 1">
+            <a:extLst>
+              <a:ext uri="{FF2B5EF4-FFF2-40B4-BE49-F238E27FC236}">
+                <a16:creationId xmlns:a16="http://schemas.microsoft.com/office/drawing/2014/main" id="{DE82B03C-980B-BC4C-A757-1749FFB53745}"/>
+              </a:ext>
+            </a:extLst>
+          </p:cNvPr>
+          <p:cNvSpPr>
+            <a:spLocks noGrp="1"/>
+          </p:cNvSpPr>
+          <p:nvPr>
+            <p:ph type="title"/>
+          </p:nvPr>
+        </p:nvSpPr>
+        <p:spPr/>
+        <p:txBody>
+          <a:bodyPr/>
+          <a:lstStyle/>
+          <a:p>
+            <a:r>
+              <a:rPr lang="en-US" dirty="0"/>
+              <a:t>DEMO PLACEHOLDER CUT IT OFF</a:t>
+            </a:r>
+          </a:p>
+        </p:txBody>
+      </p:sp>
+      <p:sp>
+        <p:nvSpPr>
+          <p:cNvPr id="3" name="Content Placeholder 2">
+            <a:extLst>
+              <a:ext uri="{FF2B5EF4-FFF2-40B4-BE49-F238E27FC236}">
+                <a16:creationId xmlns:a16="http://schemas.microsoft.com/office/drawing/2014/main" id="{564387FB-2B02-014F-AFC6-C2E79FD8B216}"/>
+              </a:ext>
+            </a:extLst>
+          </p:cNvPr>
+          <p:cNvSpPr>
+            <a:spLocks noGrp="1"/>
+          </p:cNvSpPr>
+          <p:nvPr>
+            <p:ph idx="1"/>
+          </p:nvPr>
+        </p:nvSpPr>
+        <p:spPr/>
+        <p:txBody>
+          <a:bodyPr/>
+          <a:lstStyle/>
+          <a:p>
+            <a:r>
+              <a:rPr lang="en-US" dirty="0">
+                <a:solidFill>
+                  <a:srgbClr val="FECC71"/>
+                </a:solidFill>
+              </a:rPr>
+              <a:t>Demo CUT IT OFF FROM THE VIDEO</a:t>
+            </a:r>
+          </a:p>
+          <a:p>
+            <a:endParaRPr lang="en-US" dirty="0">
+              <a:solidFill>
+                <a:srgbClr val="FECC71"/>
+              </a:solidFill>
+            </a:endParaRPr>
+          </a:p>
+          <a:p>
+            <a:r>
+              <a:rPr lang="en-US" dirty="0" err="1">
+                <a:solidFill>
+                  <a:srgbClr val="FECC71"/>
+                </a:solidFill>
+              </a:rPr>
+              <a:t>EqualsImplementingClass</a:t>
+            </a:r>
+            <a:endParaRPr lang="en-US" dirty="0">
+              <a:solidFill>
+                <a:srgbClr val="FECC71"/>
+              </a:solidFill>
+            </a:endParaRPr>
+          </a:p>
+        </p:txBody>
+      </p:sp>
+    </p:spTree>
+    <p:extLst>
+      <p:ext uri="{BB962C8B-B14F-4D97-AF65-F5344CB8AC3E}">
+        <p14:creationId xmlns:p14="http://schemas.microsoft.com/office/powerpoint/2010/main" val="3356648815"/>
+      </p:ext>
+    </p:extLst>
+  </p:cSld>
+  <p:clrMapOvr>
+    <a:masterClrMapping/>
+  </p:clrMapOvr>
+</p:sld>
+</file>
+
+<file path=ppt/slides/slide13.xml><?xml version="1.0" encoding="utf-8"?>
+<p:sld xmlns:a="http://schemas.openxmlformats.org/drawingml/2006/main" xmlns:r="http://schemas.openxmlformats.org/officeDocument/2006/relationships" xmlns:p="http://schemas.openxmlformats.org/presentationml/2006/main">
+  <p:cSld>
+    <p:spTree>
+      <p:nvGrpSpPr>
+        <p:cNvPr id="1" name=""/>
+        <p:cNvGrpSpPr/>
+        <p:nvPr/>
+      </p:nvGrpSpPr>
+      <p:grpSpPr>
+        <a:xfrm>
+          <a:off x="0" y="0"/>
+          <a:ext cx="0" cy="0"/>
+          <a:chOff x="0" y="0"/>
+          <a:chExt cx="0" cy="0"/>
+        </a:xfrm>
+      </p:grpSpPr>
+      <p:sp>
+        <p:nvSpPr>
+          <p:cNvPr id="2" name="Title 1">
+            <a:extLst>
+              <a:ext uri="{FF2B5EF4-FFF2-40B4-BE49-F238E27FC236}">
+                <a16:creationId xmlns:a16="http://schemas.microsoft.com/office/drawing/2014/main" id="{DE82B03C-980B-BC4C-A757-1749FFB53745}"/>
+              </a:ext>
+            </a:extLst>
+          </p:cNvPr>
+          <p:cNvSpPr>
+            <a:spLocks noGrp="1"/>
+          </p:cNvSpPr>
+          <p:nvPr>
+            <p:ph type="title"/>
+          </p:nvPr>
+        </p:nvSpPr>
+        <p:spPr/>
+        <p:txBody>
+          <a:bodyPr/>
+          <a:lstStyle/>
+          <a:p>
+            <a:r>
+              <a:rPr lang="en-US" dirty="0"/>
+              <a:t>private … </a:t>
+            </a:r>
+            <a:r>
+              <a:rPr lang="en-US" dirty="0">
+                <a:solidFill>
+                  <a:srgbClr val="D0832F"/>
+                </a:solidFill>
+              </a:rPr>
+              <a:t>almost</a:t>
+            </a:r>
+          </a:p>
+        </p:txBody>
+      </p:sp>
+      <p:sp>
+        <p:nvSpPr>
+          <p:cNvPr id="3" name="Content Placeholder 2">
+            <a:extLst>
+              <a:ext uri="{FF2B5EF4-FFF2-40B4-BE49-F238E27FC236}">
+                <a16:creationId xmlns:a16="http://schemas.microsoft.com/office/drawing/2014/main" id="{564387FB-2B02-014F-AFC6-C2E79FD8B216}"/>
+              </a:ext>
+            </a:extLst>
+          </p:cNvPr>
+          <p:cNvSpPr>
+            <a:spLocks noGrp="1"/>
+          </p:cNvSpPr>
+          <p:nvPr>
+            <p:ph idx="1"/>
+          </p:nvPr>
+        </p:nvSpPr>
+        <p:spPr/>
+        <p:txBody>
+          <a:bodyPr>
+            <a:normAutofit/>
+          </a:bodyPr>
+          <a:lstStyle/>
+          <a:p>
+            <a:r>
+              <a:rPr lang="en-US" dirty="0">
+                <a:solidFill>
+                  <a:srgbClr val="FECC71"/>
+                </a:solidFill>
+              </a:rPr>
+              <a:t>“is visible only in the same class”</a:t>
+            </a:r>
+          </a:p>
+        </p:txBody>
+      </p:sp>
+      <p:sp>
+        <p:nvSpPr>
+          <p:cNvPr id="5" name="Content Placeholder 2">
+            <a:extLst>
+              <a:ext uri="{FF2B5EF4-FFF2-40B4-BE49-F238E27FC236}">
+                <a16:creationId xmlns:a16="http://schemas.microsoft.com/office/drawing/2014/main" id="{8CE6AF6A-4A29-F244-B22D-8B92012C6BA5}"/>
+              </a:ext>
+            </a:extLst>
+          </p:cNvPr>
+          <p:cNvSpPr txBox="1">
+            <a:spLocks/>
+          </p:cNvSpPr>
+          <p:nvPr/>
+        </p:nvSpPr>
+        <p:spPr>
+          <a:xfrm>
+            <a:off x="838200" y="1832552"/>
+            <a:ext cx="10515600" cy="4351338"/>
+          </a:xfrm>
+          <a:prstGeom prst="rect">
+            <a:avLst/>
+          </a:prstGeom>
+        </p:spPr>
+        <p:txBody>
+          <a:bodyPr vert="horz" lIns="91440" tIns="45720" rIns="91440" bIns="45720" rtlCol="0">
+            <a:normAutofit/>
+          </a:bodyPr>
+          <a:lstStyle>
+            <a:lvl1pPr marL="228600" indent="-228600" algn="l" defTabSz="914400" rtl="0" eaLnBrk="1" latinLnBrk="0" hangingPunct="1">
+              <a:lnSpc>
+                <a:spcPct val="90000"/>
+              </a:lnSpc>
+              <a:spcBef>
+                <a:spcPts val="1000"/>
+              </a:spcBef>
+              <a:buFont typeface="Arial" panose="020B0604020202020204" pitchFamily="34" charset="0"/>
+              <a:buChar char="•"/>
+              <a:defRPr sz="2800" b="0" i="0" kern="1200">
+                <a:solidFill>
+                  <a:srgbClr val="A6B3BF"/>
+                </a:solidFill>
+                <a:latin typeface="JetBrains Mono" panose="020B0509020102050004" pitchFamily="49" charset="77"/>
+                <a:ea typeface="+mn-ea"/>
+                <a:cs typeface="+mn-cs"/>
+              </a:defRPr>
+            </a:lvl1pPr>
+            <a:lvl2pPr marL="685800" indent="-228600" algn="l" defTabSz="914400" rtl="0" eaLnBrk="1" latinLnBrk="0" hangingPunct="1">
+              <a:lnSpc>
+                <a:spcPct val="90000"/>
+              </a:lnSpc>
+              <a:spcBef>
+                <a:spcPts val="500"/>
+              </a:spcBef>
+              <a:buFont typeface="Arial" panose="020B0604020202020204" pitchFamily="34" charset="0"/>
+              <a:buChar char="•"/>
+              <a:defRPr sz="2400" b="0" i="0" kern="1200">
+                <a:solidFill>
+                  <a:srgbClr val="A6B3BF"/>
+                </a:solidFill>
+                <a:latin typeface="JetBrains Mono" panose="020B0509020102050004" pitchFamily="49" charset="77"/>
+                <a:ea typeface="+mn-ea"/>
+                <a:cs typeface="+mn-cs"/>
+              </a:defRPr>
+            </a:lvl2pPr>
+            <a:lvl3pPr marL="1143000" indent="-228600" algn="l" defTabSz="914400" rtl="0" eaLnBrk="1" latinLnBrk="0" hangingPunct="1">
+              <a:lnSpc>
+                <a:spcPct val="90000"/>
+              </a:lnSpc>
+              <a:spcBef>
+                <a:spcPts val="500"/>
+              </a:spcBef>
+              <a:buFont typeface="Arial" panose="020B0604020202020204" pitchFamily="34" charset="0"/>
+              <a:buChar char="•"/>
+              <a:defRPr sz="2000" b="0" i="0" kern="1200">
+                <a:solidFill>
+                  <a:srgbClr val="A6B3BF"/>
+                </a:solidFill>
+                <a:latin typeface="JetBrains Mono" panose="020B0509020102050004" pitchFamily="49" charset="77"/>
+                <a:ea typeface="+mn-ea"/>
+                <a:cs typeface="+mn-cs"/>
+              </a:defRPr>
+            </a:lvl3pPr>
+            <a:lvl4pPr marL="1600200" indent="-228600" algn="l" defTabSz="914400" rtl="0" eaLnBrk="1" latinLnBrk="0" hangingPunct="1">
+              <a:lnSpc>
+                <a:spcPct val="90000"/>
+              </a:lnSpc>
+              <a:spcBef>
+                <a:spcPts val="500"/>
+              </a:spcBef>
+              <a:buFont typeface="Arial" panose="020B0604020202020204" pitchFamily="34" charset="0"/>
+              <a:buChar char="•"/>
+              <a:defRPr sz="1800" b="0" i="0" kern="1200">
+                <a:solidFill>
+                  <a:srgbClr val="A6B3BF"/>
+                </a:solidFill>
+                <a:latin typeface="JetBrains Mono" panose="020B0509020102050004" pitchFamily="49" charset="77"/>
+                <a:ea typeface="+mn-ea"/>
+                <a:cs typeface="+mn-cs"/>
+              </a:defRPr>
+            </a:lvl4pPr>
+            <a:lvl5pPr marL="2057400" indent="-228600" algn="l" defTabSz="914400" rtl="0" eaLnBrk="1" latinLnBrk="0" hangingPunct="1">
+              <a:lnSpc>
+                <a:spcPct val="90000"/>
+              </a:lnSpc>
+              <a:spcBef>
+                <a:spcPts val="500"/>
+              </a:spcBef>
+              <a:buFont typeface="Arial" panose="020B0604020202020204" pitchFamily="34" charset="0"/>
+              <a:buChar char="•"/>
+              <a:defRPr sz="1800" b="0" i="0" kern="1200">
+                <a:solidFill>
+                  <a:srgbClr val="A6B3BF"/>
+                </a:solidFill>
+                <a:latin typeface="JetBrains Mono" panose="020B0509020102050004" pitchFamily="49" charset="77"/>
+                <a:ea typeface="+mn-ea"/>
+                <a:cs typeface="+mn-cs"/>
+              </a:defRPr>
+            </a:lvl5pPr>
+            <a:lvl6pPr marL="2514600" indent="-228600" algn="l" defTabSz="914400" rtl="0" eaLnBrk="1" latinLnBrk="0" hangingPunct="1">
+              <a:lnSpc>
+                <a:spcPct val="90000"/>
+              </a:lnSpc>
+              <a:spcBef>
+                <a:spcPts val="500"/>
+              </a:spcBef>
+              <a:buFont typeface="Arial" panose="020B0604020202020204" pitchFamily="34" charset="0"/>
+              <a:buChar char="•"/>
+              <a:defRPr sz="1800" kern="1200">
+                <a:solidFill>
+                  <a:schemeClr val="tx1"/>
+                </a:solidFill>
+                <a:latin typeface="+mn-lt"/>
+                <a:ea typeface="+mn-ea"/>
+                <a:cs typeface="+mn-cs"/>
+              </a:defRPr>
+            </a:lvl6pPr>
+            <a:lvl7pPr marL="2971800" indent="-228600" algn="l" defTabSz="914400" rtl="0" eaLnBrk="1" latinLnBrk="0" hangingPunct="1">
+              <a:lnSpc>
+                <a:spcPct val="90000"/>
+              </a:lnSpc>
+              <a:spcBef>
+                <a:spcPts val="500"/>
+              </a:spcBef>
+              <a:buFont typeface="Arial" panose="020B0604020202020204" pitchFamily="34" charset="0"/>
+              <a:buChar char="•"/>
+              <a:defRPr sz="1800" kern="1200">
+                <a:solidFill>
+                  <a:schemeClr val="tx1"/>
+                </a:solidFill>
+                <a:latin typeface="+mn-lt"/>
+                <a:ea typeface="+mn-ea"/>
+                <a:cs typeface="+mn-cs"/>
+              </a:defRPr>
+            </a:lvl7pPr>
+            <a:lvl8pPr marL="3429000" indent="-228600" algn="l" defTabSz="914400" rtl="0" eaLnBrk="1" latinLnBrk="0" hangingPunct="1">
+              <a:lnSpc>
+                <a:spcPct val="90000"/>
+              </a:lnSpc>
+              <a:spcBef>
+                <a:spcPts val="500"/>
+              </a:spcBef>
+              <a:buFont typeface="Arial" panose="020B0604020202020204" pitchFamily="34" charset="0"/>
+              <a:buChar char="•"/>
+              <a:defRPr sz="1800" kern="1200">
+                <a:solidFill>
+                  <a:schemeClr val="tx1"/>
+                </a:solidFill>
+                <a:latin typeface="+mn-lt"/>
+                <a:ea typeface="+mn-ea"/>
+                <a:cs typeface="+mn-cs"/>
+              </a:defRPr>
+            </a:lvl8pPr>
+            <a:lvl9pPr marL="3886200" indent="-228600" algn="l" defTabSz="914400" rtl="0" eaLnBrk="1" latinLnBrk="0" hangingPunct="1">
+              <a:lnSpc>
+                <a:spcPct val="90000"/>
+              </a:lnSpc>
+              <a:spcBef>
+                <a:spcPts val="500"/>
+              </a:spcBef>
+              <a:buFont typeface="Arial" panose="020B0604020202020204" pitchFamily="34" charset="0"/>
+              <a:buChar char="•"/>
+              <a:defRPr sz="1800" kern="1200">
+                <a:solidFill>
+                  <a:schemeClr val="tx1"/>
+                </a:solidFill>
+                <a:latin typeface="+mn-lt"/>
+                <a:ea typeface="+mn-ea"/>
+                <a:cs typeface="+mn-cs"/>
+              </a:defRPr>
+            </a:lvl9pPr>
+          </a:lstStyle>
+          <a:p>
+            <a:pPr marL="0" indent="0">
+              <a:buNone/>
+            </a:pPr>
+            <a:endParaRPr lang="en-US" dirty="0">
+              <a:solidFill>
+                <a:srgbClr val="FECC71"/>
+              </a:solidFill>
+            </a:endParaRPr>
+          </a:p>
+          <a:p>
+            <a:endParaRPr lang="en-US" dirty="0">
+              <a:solidFill>
+                <a:srgbClr val="FECC71"/>
+              </a:solidFill>
+            </a:endParaRPr>
+          </a:p>
+          <a:p>
+            <a:endParaRPr lang="en-US" dirty="0">
+              <a:solidFill>
+                <a:srgbClr val="FECC71"/>
+              </a:solidFill>
+            </a:endParaRPr>
+          </a:p>
+          <a:p>
+            <a:pPr marL="0" indent="0">
+              <a:buFont typeface="Arial" panose="020B0604020202020204" pitchFamily="34" charset="0"/>
+              <a:buNone/>
+            </a:pPr>
+            <a:r>
+              <a:rPr lang="en-US" dirty="0">
+                <a:solidFill>
+                  <a:srgbClr val="FECC71"/>
+                </a:solidFill>
+              </a:rPr>
+              <a:t>		is NOT</a:t>
+            </a:r>
+          </a:p>
+          <a:p>
+            <a:pPr marL="0" indent="0">
+              <a:buFont typeface="Arial" panose="020B0604020202020204" pitchFamily="34" charset="0"/>
+              <a:buNone/>
+            </a:pPr>
+            <a:r>
+              <a:rPr lang="en-US" dirty="0">
+                <a:solidFill>
+                  <a:srgbClr val="FECC71"/>
+                </a:solidFill>
+              </a:rPr>
+              <a:t>		what the </a:t>
+            </a:r>
+          </a:p>
+          <a:p>
+            <a:pPr marL="0" indent="0">
+              <a:buFont typeface="Arial" panose="020B0604020202020204" pitchFamily="34" charset="0"/>
+              <a:buNone/>
+            </a:pPr>
+            <a:r>
+              <a:rPr lang="en-US" dirty="0">
+                <a:solidFill>
+                  <a:srgbClr val="FECC71"/>
+                </a:solidFill>
+              </a:rPr>
+              <a:t>			Java Language Specification says</a:t>
+            </a:r>
+          </a:p>
+        </p:txBody>
+      </p:sp>
+    </p:spTree>
+    <p:extLst>
+      <p:ext uri="{BB962C8B-B14F-4D97-AF65-F5344CB8AC3E}">
+        <p14:creationId xmlns:p14="http://schemas.microsoft.com/office/powerpoint/2010/main" val="385916242"/>
+      </p:ext>
+    </p:extLst>
+  </p:cSld>
+  <p:clrMapOvr>
+    <a:masterClrMapping/>
+  </p:clrMapOvr>
+  <p:timing>
+    <p:tnLst>
+      <p:par>
+        <p:cTn id="1" dur="indefinite" restart="never" nodeType="tmRoot">
+          <p:childTnLst>
+            <p:seq concurrent="1" nextAc="seek">
+              <p:cTn id="2" dur="indefinite" nodeType="mainSeq">
+                <p:childTnLst>
+                  <p:par>
+                    <p:cTn id="3" fill="hold">
+                      <p:stCondLst>
+                        <p:cond delay="indefinite"/>
+                      </p:stCondLst>
+                      <p:childTnLst>
+                        <p:par>
+                          <p:cTn id="4" fill="hold">
+                            <p:stCondLst>
+                              <p:cond delay="0"/>
+                            </p:stCondLst>
+                            <p:childTnLst>
+                              <p:par>
+                                <p:cTn id="5" presetID="1" presetClass="entr" presetSubtype="0" fill="hold" grpId="0" nodeType="clickEffect">
+                                  <p:stCondLst>
+                                    <p:cond delay="0"/>
+                                  </p:stCondLst>
+                                  <p:childTnLst>
+                                    <p:set>
+                                      <p:cBhvr>
+                                        <p:cTn id="6" dur="1" fill="hold">
+                                          <p:stCondLst>
+                                            <p:cond delay="0"/>
+                                          </p:stCondLst>
+                                        </p:cTn>
+                                        <p:tgtEl>
+                                          <p:spTgt spid="3"/>
+                                        </p:tgtEl>
+                                        <p:attrNameLst>
+                                          <p:attrName>style.visibility</p:attrName>
+                                        </p:attrNameLst>
+                                      </p:cBhvr>
+                                      <p:to>
+                                        <p:strVal val="visible"/>
+                                      </p:to>
+                                    </p:set>
+                                  </p:childTnLst>
+                                </p:cTn>
+                              </p:par>
+                            </p:childTnLst>
+                          </p:cTn>
+                        </p:par>
+                      </p:childTnLst>
+                    </p:cTn>
+                  </p:par>
+                  <p:par>
+                    <p:cTn id="7" fill="hold">
+                      <p:stCondLst>
+                        <p:cond delay="indefinite"/>
+                      </p:stCondLst>
+                      <p:childTnLst>
+                        <p:par>
+                          <p:cTn id="8" fill="hold">
+                            <p:stCondLst>
+                              <p:cond delay="0"/>
+                            </p:stCondLst>
+                            <p:childTnLst>
+                              <p:par>
+                                <p:cTn id="9" presetID="1" presetClass="entr" presetSubtype="0" fill="hold" grpId="0" nodeType="clickEffect">
+                                  <p:stCondLst>
+                                    <p:cond delay="0"/>
+                                  </p:stCondLst>
+                                  <p:childTnLst>
+                                    <p:set>
+                                      <p:cBhvr>
+                                        <p:cTn id="10" dur="1" fill="hold">
+                                          <p:stCondLst>
+                                            <p:cond delay="0"/>
+                                          </p:stCondLst>
+                                        </p:cTn>
+                                        <p:tgtEl>
+                                          <p:spTgt spid="5"/>
+                                        </p:tgtEl>
+                                        <p:attrNameLst>
+                                          <p:attrName>style.visibility</p:attrName>
+                                        </p:attrNameLst>
+                                      </p:cBhvr>
+                                      <p:to>
+                                        <p:strVal val="visible"/>
+                                      </p:to>
+                                    </p:set>
+                                  </p:childTnLst>
+                                </p:cTn>
+                              </p:par>
+                            </p:childTnLst>
+                          </p:cTn>
+                        </p:par>
+                      </p:childTnLst>
+                    </p:cTn>
+                  </p:par>
+                </p:childTnLst>
+              </p:cTn>
+              <p:prevCondLst>
+                <p:cond evt="onPrev" delay="0">
+                  <p:tgtEl>
+                    <p:sldTgt/>
+                  </p:tgtEl>
+                </p:cond>
+              </p:prevCondLst>
+              <p:nextCondLst>
+                <p:cond evt="onNext" delay="0">
+                  <p:tgtEl>
+                    <p:sldTgt/>
+                  </p:tgtEl>
+                </p:cond>
+              </p:nextCondLst>
+            </p:seq>
+          </p:childTnLst>
+        </p:cTn>
+      </p:par>
+    </p:tnLst>
+    <p:bldLst>
+      <p:bldP spid="3" grpId="0"/>
+      <p:bldP spid="5" grpId="0"/>
+    </p:bldLst>
+  </p:timing>
+</p:sld>
+</file>
+
+<file path=ppt/slides/slide14.xml><?xml version="1.0" encoding="utf-8"?>
+<p:sld xmlns:a="http://schemas.openxmlformats.org/drawingml/2006/main" xmlns:r="http://schemas.openxmlformats.org/officeDocument/2006/relationships" xmlns:p="http://schemas.openxmlformats.org/presentationml/2006/main">
+  <p:cSld>
+    <p:spTree>
+      <p:nvGrpSpPr>
+        <p:cNvPr id="1" name=""/>
+        <p:cNvGrpSpPr/>
+        <p:nvPr/>
+      </p:nvGrpSpPr>
+      <p:grpSpPr>
+        <a:xfrm>
+          <a:off x="0" y="0"/>
+          <a:ext cx="0" cy="0"/>
+          <a:chOff x="0" y="0"/>
+          <a:chExt cx="0" cy="0"/>
+        </a:xfrm>
+      </p:grpSpPr>
+      <p:sp>
+        <p:nvSpPr>
+          <p:cNvPr id="2" name="Title 1">
+            <a:extLst>
+              <a:ext uri="{FF2B5EF4-FFF2-40B4-BE49-F238E27FC236}">
+                <a16:creationId xmlns:a16="http://schemas.microsoft.com/office/drawing/2014/main" id="{DE82B03C-980B-BC4C-A757-1749FFB53745}"/>
+              </a:ext>
+            </a:extLst>
+          </p:cNvPr>
+          <p:cNvSpPr>
+            <a:spLocks noGrp="1"/>
+          </p:cNvSpPr>
+          <p:nvPr>
+            <p:ph type="title"/>
+          </p:nvPr>
+        </p:nvSpPr>
+        <p:spPr/>
+        <p:txBody>
+          <a:bodyPr>
+            <a:noAutofit/>
+          </a:bodyPr>
+          <a:lstStyle/>
+          <a:p>
+            <a:r>
+              <a:rPr lang="en-US" sz="2400" b="0" dirty="0">
+                <a:solidFill>
+                  <a:srgbClr val="FECC71"/>
+                </a:solidFill>
+                <a:ea typeface="+mn-ea"/>
+                <a:cs typeface="+mn-cs"/>
+              </a:rPr>
+              <a:t>https://</a:t>
+            </a:r>
+            <a:r>
+              <a:rPr lang="en-US" sz="2400" b="0" dirty="0" err="1">
+                <a:solidFill>
+                  <a:srgbClr val="FECC71"/>
+                </a:solidFill>
+                <a:ea typeface="+mn-ea"/>
+                <a:cs typeface="+mn-cs"/>
+              </a:rPr>
+              <a:t>docs.oracle.com</a:t>
+            </a:r>
+            <a:r>
+              <a:rPr lang="en-US" sz="2400" b="0" dirty="0">
+                <a:solidFill>
+                  <a:srgbClr val="FECC71"/>
+                </a:solidFill>
+                <a:ea typeface="+mn-ea"/>
+                <a:cs typeface="+mn-cs"/>
+              </a:rPr>
+              <a:t>/</a:t>
+            </a:r>
+            <a:r>
+              <a:rPr lang="en-US" sz="2400" b="0" dirty="0" err="1">
+                <a:solidFill>
+                  <a:srgbClr val="FECC71"/>
+                </a:solidFill>
+                <a:ea typeface="+mn-ea"/>
+                <a:cs typeface="+mn-cs"/>
+              </a:rPr>
+              <a:t>javase</a:t>
+            </a:r>
+            <a:r>
+              <a:rPr lang="en-US" sz="2400" b="0" dirty="0">
+                <a:solidFill>
+                  <a:srgbClr val="FECC71"/>
+                </a:solidFill>
+                <a:ea typeface="+mn-ea"/>
+                <a:cs typeface="+mn-cs"/>
+              </a:rPr>
+              <a:t>/specs/</a:t>
+            </a:r>
+            <a:r>
+              <a:rPr lang="en-US" sz="2400" b="0" dirty="0" err="1">
+                <a:solidFill>
+                  <a:srgbClr val="FECC71"/>
+                </a:solidFill>
+                <a:ea typeface="+mn-ea"/>
+                <a:cs typeface="+mn-cs"/>
+              </a:rPr>
+              <a:t>jls</a:t>
+            </a:r>
+            <a:r>
+              <a:rPr lang="en-US" sz="2400" b="0" dirty="0">
+                <a:solidFill>
+                  <a:srgbClr val="FECC71"/>
+                </a:solidFill>
+                <a:ea typeface="+mn-ea"/>
+                <a:cs typeface="+mn-cs"/>
+              </a:rPr>
+              <a:t>/se14/jls14.pdf</a:t>
+            </a:r>
+            <a:br>
+              <a:rPr lang="en-US" sz="3600" dirty="0"/>
+            </a:br>
+            <a:endParaRPr lang="en-US" sz="3600" dirty="0"/>
+          </a:p>
+        </p:txBody>
+      </p:sp>
+      <p:pic>
+        <p:nvPicPr>
+          <p:cNvPr id="4" name="Picture 3">
+            <a:extLst>
+              <a:ext uri="{FF2B5EF4-FFF2-40B4-BE49-F238E27FC236}">
+                <a16:creationId xmlns:a16="http://schemas.microsoft.com/office/drawing/2014/main" id="{90876ACC-EC2A-D448-A5F4-8ED6F480F1FB}"/>
+              </a:ext>
+            </a:extLst>
+          </p:cNvPr>
+          <p:cNvPicPr>
+            <a:picLocks noChangeAspect="1"/>
+          </p:cNvPicPr>
+          <p:nvPr/>
+        </p:nvPicPr>
+        <p:blipFill>
+          <a:blip r:embed="rId3"/>
+          <a:stretch>
+            <a:fillRect/>
+          </a:stretch>
+        </p:blipFill>
+        <p:spPr>
+          <a:xfrm>
+            <a:off x="4076700" y="1690688"/>
+            <a:ext cx="4038600" cy="4038600"/>
+          </a:xfrm>
+          <a:prstGeom prst="rect">
+            <a:avLst/>
+          </a:prstGeom>
+        </p:spPr>
+      </p:pic>
+    </p:spTree>
+    <p:extLst>
+      <p:ext uri="{BB962C8B-B14F-4D97-AF65-F5344CB8AC3E}">
+        <p14:creationId xmlns:p14="http://schemas.microsoft.com/office/powerpoint/2010/main" val="2398217396"/>
+      </p:ext>
+    </p:extLst>
+  </p:cSld>
+  <p:clrMapOvr>
+    <a:masterClrMapping/>
+  </p:clrMapOvr>
+</p:sld>
+</file>
+
+<file path=ppt/slides/slide15.xml><?xml version="1.0" encoding="utf-8"?>
+<p:sld xmlns:a="http://schemas.openxmlformats.org/drawingml/2006/main" xmlns:r="http://schemas.openxmlformats.org/officeDocument/2006/relationships" xmlns:p="http://schemas.openxmlformats.org/presentationml/2006/main">
+  <p:cSld>
+    <p:spTree>
+      <p:nvGrpSpPr>
+        <p:cNvPr id="1" name=""/>
+        <p:cNvGrpSpPr/>
+        <p:nvPr/>
+      </p:nvGrpSpPr>
+      <p:grpSpPr>
+        <a:xfrm>
+          <a:off x="0" y="0"/>
+          <a:ext cx="0" cy="0"/>
+          <a:chOff x="0" y="0"/>
+          <a:chExt cx="0" cy="0"/>
+        </a:xfrm>
+      </p:grpSpPr>
+      <p:pic>
+        <p:nvPicPr>
+          <p:cNvPr id="9" name="Picture 8">
+            <a:extLst>
+              <a:ext uri="{FF2B5EF4-FFF2-40B4-BE49-F238E27FC236}">
+                <a16:creationId xmlns:a16="http://schemas.microsoft.com/office/drawing/2014/main" id="{D8B4C16C-5444-5245-A641-1106F2839EEF}"/>
+              </a:ext>
+            </a:extLst>
+          </p:cNvPr>
+          <p:cNvPicPr>
+            <a:picLocks noChangeAspect="1"/>
+          </p:cNvPicPr>
+          <p:nvPr/>
+        </p:nvPicPr>
+        <p:blipFill>
+          <a:blip r:embed="rId3"/>
+          <a:stretch>
+            <a:fillRect/>
+          </a:stretch>
+        </p:blipFill>
+        <p:spPr>
+          <a:xfrm>
+            <a:off x="0" y="-738507"/>
+            <a:ext cx="12191999" cy="8335013"/>
+          </a:xfrm>
+          <a:prstGeom prst="rect">
+            <a:avLst/>
+          </a:prstGeom>
+        </p:spPr>
+      </p:pic>
+      <p:sp>
+        <p:nvSpPr>
+          <p:cNvPr id="10" name="Oval 9">
+            <a:extLst>
+              <a:ext uri="{FF2B5EF4-FFF2-40B4-BE49-F238E27FC236}">
+                <a16:creationId xmlns:a16="http://schemas.microsoft.com/office/drawing/2014/main" id="{7FFA970F-2B36-CC4F-8853-D22B50208AE2}"/>
+              </a:ext>
+            </a:extLst>
+          </p:cNvPr>
+          <p:cNvSpPr/>
+          <p:nvPr/>
+        </p:nvSpPr>
+        <p:spPr>
+          <a:xfrm>
+            <a:off x="443342" y="1330036"/>
+            <a:ext cx="11139054" cy="1717963"/>
+          </a:xfrm>
+          <a:prstGeom prst="ellipse">
+            <a:avLst/>
+          </a:prstGeom>
+          <a:noFill/>
+          <a:ln w="57150">
+            <a:solidFill>
+              <a:srgbClr val="C00000"/>
+            </a:solidFill>
+          </a:ln>
+        </p:spPr>
+        <p:style>
+          <a:lnRef idx="2">
+            <a:schemeClr val="accent1">
+              <a:shade val="50000"/>
+            </a:schemeClr>
+          </a:lnRef>
+          <a:fillRef idx="1">
+            <a:schemeClr val="accent1"/>
+          </a:fillRef>
+          <a:effectRef idx="0">
+            <a:schemeClr val="accent1"/>
+          </a:effectRef>
+          <a:fontRef idx="minor">
+            <a:schemeClr val="lt1"/>
+          </a:fontRef>
+        </p:style>
+        <p:txBody>
+          <a:bodyPr rtlCol="0" anchor="ctr"/>
+          <a:lstStyle/>
+          <a:p>
+            <a:pPr algn="ctr"/>
+            <a:endParaRPr lang="en-US"/>
+          </a:p>
+        </p:txBody>
+      </p:sp>
+    </p:spTree>
+    <p:extLst>
+      <p:ext uri="{BB962C8B-B14F-4D97-AF65-F5344CB8AC3E}">
+        <p14:creationId xmlns:p14="http://schemas.microsoft.com/office/powerpoint/2010/main" val="1529148261"/>
+      </p:ext>
+    </p:extLst>
+  </p:cSld>
+  <p:clrMapOvr>
+    <a:masterClrMapping/>
+  </p:clrMapOvr>
+  <p:timing>
+    <p:tnLst>
+      <p:par>
+        <p:cTn id="1" dur="indefinite" restart="never" nodeType="tmRoot">
+          <p:childTnLst>
+            <p:seq concurrent="1" nextAc="seek">
+              <p:cTn id="2" dur="indefinite" nodeType="mainSeq">
+                <p:childTnLst>
+                  <p:par>
+                    <p:cTn id="3" fill="hold">
+                      <p:stCondLst>
+                        <p:cond delay="indefinite"/>
+                      </p:stCondLst>
+                      <p:childTnLst>
+                        <p:par>
+                          <p:cTn id="4" fill="hold">
+                            <p:stCondLst>
+                              <p:cond delay="0"/>
+                            </p:stCondLst>
+                            <p:childTnLst>
+                              <p:par>
+                                <p:cTn id="5" presetID="1" presetClass="entr" presetSubtype="0" fill="hold" grpId="0" nodeType="clickEffect">
+                                  <p:stCondLst>
+                                    <p:cond delay="0"/>
+                                  </p:stCondLst>
+                                  <p:childTnLst>
+                                    <p:set>
+                                      <p:cBhvr>
+                                        <p:cTn id="6" dur="1" fill="hold">
+                                          <p:stCondLst>
+                                            <p:cond delay="0"/>
+                                          </p:stCondLst>
+                                        </p:cTn>
+                                        <p:tgtEl>
+                                          <p:spTgt spid="10"/>
+                                        </p:tgtEl>
+                                        <p:attrNameLst>
+                                          <p:attrName>style.visibility</p:attrName>
+                                        </p:attrNameLst>
+                                      </p:cBhvr>
+                                      <p:to>
+                                        <p:strVal val="visible"/>
+                                      </p:to>
+                                    </p:set>
+                                  </p:childTnLst>
+                                </p:cTn>
+                              </p:par>
+                            </p:childTnLst>
+                          </p:cTn>
+                        </p:par>
+                      </p:childTnLst>
+                    </p:cTn>
+                  </p:par>
+                </p:childTnLst>
+              </p:cTn>
+              <p:prevCondLst>
+                <p:cond evt="onPrev" delay="0">
+                  <p:tgtEl>
+                    <p:sldTgt/>
+                  </p:tgtEl>
+                </p:cond>
+              </p:prevCondLst>
+              <p:nextCondLst>
+                <p:cond evt="onNext" delay="0">
+                  <p:tgtEl>
+                    <p:sldTgt/>
+                  </p:tgtEl>
+                </p:cond>
+              </p:nextCondLst>
+            </p:seq>
+          </p:childTnLst>
+        </p:cTn>
+      </p:par>
+    </p:tnLst>
+    <p:bldLst>
+      <p:bldP spid="10" grpId="0" animBg="1"/>
+    </p:bldLst>
+  </p:timing>
+</p:sld>
+</file>
+
+<file path=ppt/slides/slide16.xml><?xml version="1.0" encoding="utf-8"?>
+<p:sld xmlns:a="http://schemas.openxmlformats.org/drawingml/2006/main" xmlns:r="http://schemas.openxmlformats.org/officeDocument/2006/relationships" xmlns:p="http://schemas.openxmlformats.org/presentationml/2006/main">
+  <p:cSld>
+    <p:spTree>
+      <p:nvGrpSpPr>
+        <p:cNvPr id="1" name=""/>
+        <p:cNvGrpSpPr/>
+        <p:nvPr/>
+      </p:nvGrpSpPr>
+      <p:grpSpPr>
+        <a:xfrm>
+          <a:off x="0" y="0"/>
+          <a:ext cx="0" cy="0"/>
+          <a:chOff x="0" y="0"/>
+          <a:chExt cx="0" cy="0"/>
+        </a:xfrm>
+      </p:grpSpPr>
+      <p:sp>
+        <p:nvSpPr>
+          <p:cNvPr id="2" name="Title 1">
+            <a:extLst>
+              <a:ext uri="{FF2B5EF4-FFF2-40B4-BE49-F238E27FC236}">
+                <a16:creationId xmlns:a16="http://schemas.microsoft.com/office/drawing/2014/main" id="{DE82B03C-980B-BC4C-A757-1749FFB53745}"/>
+              </a:ext>
+            </a:extLst>
+          </p:cNvPr>
+          <p:cNvSpPr>
+            <a:spLocks noGrp="1"/>
+          </p:cNvSpPr>
+          <p:nvPr>
+            <p:ph type="title"/>
+          </p:nvPr>
+        </p:nvSpPr>
+        <p:spPr/>
+        <p:txBody>
+          <a:bodyPr/>
+          <a:lstStyle/>
+          <a:p>
+            <a:r>
+              <a:rPr lang="en-US" dirty="0"/>
+              <a:t>Visualizing it</a:t>
+            </a:r>
+          </a:p>
+        </p:txBody>
+      </p:sp>
+      <p:sp>
+        <p:nvSpPr>
+          <p:cNvPr id="13" name="Rectangle 12">
+            <a:extLst>
+              <a:ext uri="{FF2B5EF4-FFF2-40B4-BE49-F238E27FC236}">
+                <a16:creationId xmlns:a16="http://schemas.microsoft.com/office/drawing/2014/main" id="{ED66F716-4555-E342-B4DE-4479FD332DD7}"/>
+              </a:ext>
+            </a:extLst>
+          </p:cNvPr>
+          <p:cNvSpPr/>
+          <p:nvPr/>
+        </p:nvSpPr>
+        <p:spPr>
+          <a:xfrm>
+            <a:off x="693053" y="1688308"/>
+            <a:ext cx="10127347" cy="4670928"/>
+          </a:xfrm>
+          <a:prstGeom prst="rect">
+            <a:avLst/>
+          </a:prstGeom>
+          <a:solidFill>
+            <a:srgbClr val="A6B3BF"/>
+          </a:solidFill>
+          <a:ln w="28575">
+            <a:solidFill>
+              <a:srgbClr val="D0832F"/>
+            </a:solidFill>
+          </a:ln>
+        </p:spPr>
+        <p:style>
+          <a:lnRef idx="2">
+            <a:schemeClr val="accent1">
+              <a:shade val="50000"/>
+            </a:schemeClr>
+          </a:lnRef>
+          <a:fillRef idx="1">
+            <a:schemeClr val="accent1"/>
+          </a:fillRef>
+          <a:effectRef idx="0">
+            <a:schemeClr val="accent1"/>
+          </a:effectRef>
+          <a:fontRef idx="minor">
+            <a:schemeClr val="lt1"/>
+          </a:fontRef>
+        </p:style>
+        <p:txBody>
+          <a:bodyPr rot="0" spcFirstLastPara="0" vert="horz" wrap="square" lIns="91440" tIns="45720" rIns="91440" bIns="45720" numCol="1" spcCol="0" rtlCol="0" fromWordArt="0" anchor="t" anchorCtr="0" forceAA="0" compatLnSpc="1">
+            <a:prstTxWarp prst="textNoShape">
+              <a:avLst/>
+            </a:prstTxWarp>
+            <a:noAutofit/>
+          </a:bodyPr>
+          <a:lstStyle>
+            <a:defPPr>
+              <a:defRPr lang="en-HU"/>
+            </a:defPPr>
+            <a:lvl1pPr marL="0" algn="l" defTabSz="914400" rtl="0" eaLnBrk="1" latinLnBrk="0" hangingPunct="1">
+              <a:defRPr sz="1800" kern="1200">
+                <a:solidFill>
+                  <a:schemeClr val="lt1"/>
+                </a:solidFill>
+                <a:latin typeface="+mn-lt"/>
+                <a:ea typeface="+mn-ea"/>
+                <a:cs typeface="+mn-cs"/>
+              </a:defRPr>
+            </a:lvl1pPr>
+            <a:lvl2pPr marL="457200" algn="l" defTabSz="914400" rtl="0" eaLnBrk="1" latinLnBrk="0" hangingPunct="1">
+              <a:defRPr sz="1800" kern="1200">
+                <a:solidFill>
+                  <a:schemeClr val="lt1"/>
+                </a:solidFill>
+                <a:latin typeface="+mn-lt"/>
+                <a:ea typeface="+mn-ea"/>
+                <a:cs typeface="+mn-cs"/>
+              </a:defRPr>
+            </a:lvl2pPr>
+            <a:lvl3pPr marL="914400" algn="l" defTabSz="914400" rtl="0" eaLnBrk="1" latinLnBrk="0" hangingPunct="1">
+              <a:defRPr sz="1800" kern="1200">
+                <a:solidFill>
+                  <a:schemeClr val="lt1"/>
+                </a:solidFill>
+                <a:latin typeface="+mn-lt"/>
+                <a:ea typeface="+mn-ea"/>
+                <a:cs typeface="+mn-cs"/>
+              </a:defRPr>
+            </a:lvl3pPr>
+            <a:lvl4pPr marL="1371600" algn="l" defTabSz="914400" rtl="0" eaLnBrk="1" latinLnBrk="0" hangingPunct="1">
+              <a:defRPr sz="1800" kern="1200">
+                <a:solidFill>
+                  <a:schemeClr val="lt1"/>
+                </a:solidFill>
+                <a:latin typeface="+mn-lt"/>
+                <a:ea typeface="+mn-ea"/>
+                <a:cs typeface="+mn-cs"/>
+              </a:defRPr>
+            </a:lvl4pPr>
+            <a:lvl5pPr marL="1828800" algn="l" defTabSz="914400" rtl="0" eaLnBrk="1" latinLnBrk="0" hangingPunct="1">
+              <a:defRPr sz="1800" kern="1200">
+                <a:solidFill>
+                  <a:schemeClr val="lt1"/>
+                </a:solidFill>
+                <a:latin typeface="+mn-lt"/>
+                <a:ea typeface="+mn-ea"/>
+                <a:cs typeface="+mn-cs"/>
+              </a:defRPr>
+            </a:lvl5pPr>
+            <a:lvl6pPr marL="2286000" algn="l" defTabSz="914400" rtl="0" eaLnBrk="1" latinLnBrk="0" hangingPunct="1">
+              <a:defRPr sz="1800" kern="1200">
+                <a:solidFill>
+                  <a:schemeClr val="lt1"/>
+                </a:solidFill>
+                <a:latin typeface="+mn-lt"/>
+                <a:ea typeface="+mn-ea"/>
+                <a:cs typeface="+mn-cs"/>
+              </a:defRPr>
+            </a:lvl6pPr>
+            <a:lvl7pPr marL="2743200" algn="l" defTabSz="914400" rtl="0" eaLnBrk="1" latinLnBrk="0" hangingPunct="1">
+              <a:defRPr sz="1800" kern="1200">
+                <a:solidFill>
+                  <a:schemeClr val="lt1"/>
+                </a:solidFill>
+                <a:latin typeface="+mn-lt"/>
+                <a:ea typeface="+mn-ea"/>
+                <a:cs typeface="+mn-cs"/>
+              </a:defRPr>
+            </a:lvl7pPr>
+            <a:lvl8pPr marL="3200400" algn="l" defTabSz="914400" rtl="0" eaLnBrk="1" latinLnBrk="0" hangingPunct="1">
+              <a:defRPr sz="1800" kern="1200">
+                <a:solidFill>
+                  <a:schemeClr val="lt1"/>
+                </a:solidFill>
+                <a:latin typeface="+mn-lt"/>
+                <a:ea typeface="+mn-ea"/>
+                <a:cs typeface="+mn-cs"/>
+              </a:defRPr>
+            </a:lvl8pPr>
+            <a:lvl9pPr marL="3657600" algn="l" defTabSz="914400" rtl="0" eaLnBrk="1" latinLnBrk="0" hangingPunct="1">
+              <a:defRPr sz="1800" kern="1200">
+                <a:solidFill>
+                  <a:schemeClr val="lt1"/>
+                </a:solidFill>
+                <a:latin typeface="+mn-lt"/>
+                <a:ea typeface="+mn-ea"/>
+                <a:cs typeface="+mn-cs"/>
+              </a:defRPr>
+            </a:lvl9pPr>
+          </a:lstStyle>
+          <a:p>
+            <a:pPr algn="ctr"/>
+            <a:r>
+              <a:rPr lang="en-US" dirty="0">
+                <a:solidFill>
+                  <a:srgbClr val="D0832F"/>
+                </a:solidFill>
+              </a:rPr>
+              <a:t>top-level class</a:t>
+            </a:r>
+          </a:p>
+        </p:txBody>
+      </p:sp>
+      <p:sp>
+        <p:nvSpPr>
+          <p:cNvPr id="15" name="Rectangle 14">
+            <a:extLst>
+              <a:ext uri="{FF2B5EF4-FFF2-40B4-BE49-F238E27FC236}">
+                <a16:creationId xmlns:a16="http://schemas.microsoft.com/office/drawing/2014/main" id="{ED66F716-4555-E342-B4DE-4479FD332DD7}"/>
+              </a:ext>
+            </a:extLst>
+          </p:cNvPr>
+          <p:cNvSpPr/>
+          <p:nvPr/>
+        </p:nvSpPr>
+        <p:spPr>
+          <a:xfrm>
+            <a:off x="1080654" y="2261862"/>
+            <a:ext cx="3038961" cy="1816893"/>
+          </a:xfrm>
+          <a:prstGeom prst="rect">
+            <a:avLst/>
+          </a:prstGeom>
+          <a:solidFill>
+            <a:srgbClr val="A6B3BF"/>
+          </a:solidFill>
+          <a:ln w="28575">
+            <a:solidFill>
+              <a:srgbClr val="D0832F"/>
+            </a:solidFill>
+          </a:ln>
+        </p:spPr>
+        <p:style>
+          <a:lnRef idx="2">
+            <a:schemeClr val="accent1">
+              <a:shade val="50000"/>
+            </a:schemeClr>
+          </a:lnRef>
+          <a:fillRef idx="1">
+            <a:schemeClr val="accent1"/>
+          </a:fillRef>
+          <a:effectRef idx="0">
+            <a:schemeClr val="accent1"/>
+          </a:effectRef>
+          <a:fontRef idx="minor">
+            <a:schemeClr val="lt1"/>
+          </a:fontRef>
+        </p:style>
+        <p:txBody>
+          <a:bodyPr rot="0" spcFirstLastPara="0" vert="horz" wrap="square" lIns="91440" tIns="45720" rIns="91440" bIns="45720" numCol="1" spcCol="0" rtlCol="0" fromWordArt="0" anchor="t" anchorCtr="0" forceAA="0" compatLnSpc="1">
+            <a:prstTxWarp prst="textNoShape">
+              <a:avLst/>
+            </a:prstTxWarp>
+            <a:noAutofit/>
+          </a:bodyPr>
+          <a:lstStyle>
+            <a:defPPr>
+              <a:defRPr lang="en-HU"/>
+            </a:defPPr>
+            <a:lvl1pPr marL="0" algn="l" defTabSz="914400" rtl="0" eaLnBrk="1" latinLnBrk="0" hangingPunct="1">
+              <a:defRPr sz="1800" kern="1200">
+                <a:solidFill>
+                  <a:schemeClr val="lt1"/>
+                </a:solidFill>
+                <a:latin typeface="+mn-lt"/>
+                <a:ea typeface="+mn-ea"/>
+                <a:cs typeface="+mn-cs"/>
+              </a:defRPr>
+            </a:lvl1pPr>
+            <a:lvl2pPr marL="457200" algn="l" defTabSz="914400" rtl="0" eaLnBrk="1" latinLnBrk="0" hangingPunct="1">
+              <a:defRPr sz="1800" kern="1200">
+                <a:solidFill>
+                  <a:schemeClr val="lt1"/>
+                </a:solidFill>
+                <a:latin typeface="+mn-lt"/>
+                <a:ea typeface="+mn-ea"/>
+                <a:cs typeface="+mn-cs"/>
+              </a:defRPr>
+            </a:lvl2pPr>
+            <a:lvl3pPr marL="914400" algn="l" defTabSz="914400" rtl="0" eaLnBrk="1" latinLnBrk="0" hangingPunct="1">
+              <a:defRPr sz="1800" kern="1200">
+                <a:solidFill>
+                  <a:schemeClr val="lt1"/>
+                </a:solidFill>
+                <a:latin typeface="+mn-lt"/>
+                <a:ea typeface="+mn-ea"/>
+                <a:cs typeface="+mn-cs"/>
+              </a:defRPr>
+            </a:lvl3pPr>
+            <a:lvl4pPr marL="1371600" algn="l" defTabSz="914400" rtl="0" eaLnBrk="1" latinLnBrk="0" hangingPunct="1">
+              <a:defRPr sz="1800" kern="1200">
+                <a:solidFill>
+                  <a:schemeClr val="lt1"/>
+                </a:solidFill>
+                <a:latin typeface="+mn-lt"/>
+                <a:ea typeface="+mn-ea"/>
+                <a:cs typeface="+mn-cs"/>
+              </a:defRPr>
+            </a:lvl4pPr>
+            <a:lvl5pPr marL="1828800" algn="l" defTabSz="914400" rtl="0" eaLnBrk="1" latinLnBrk="0" hangingPunct="1">
+              <a:defRPr sz="1800" kern="1200">
+                <a:solidFill>
+                  <a:schemeClr val="lt1"/>
+                </a:solidFill>
+                <a:latin typeface="+mn-lt"/>
+                <a:ea typeface="+mn-ea"/>
+                <a:cs typeface="+mn-cs"/>
+              </a:defRPr>
+            </a:lvl5pPr>
+            <a:lvl6pPr marL="2286000" algn="l" defTabSz="914400" rtl="0" eaLnBrk="1" latinLnBrk="0" hangingPunct="1">
+              <a:defRPr sz="1800" kern="1200">
+                <a:solidFill>
+                  <a:schemeClr val="lt1"/>
+                </a:solidFill>
+                <a:latin typeface="+mn-lt"/>
+                <a:ea typeface="+mn-ea"/>
+                <a:cs typeface="+mn-cs"/>
+              </a:defRPr>
+            </a:lvl6pPr>
+            <a:lvl7pPr marL="2743200" algn="l" defTabSz="914400" rtl="0" eaLnBrk="1" latinLnBrk="0" hangingPunct="1">
+              <a:defRPr sz="1800" kern="1200">
+                <a:solidFill>
+                  <a:schemeClr val="lt1"/>
+                </a:solidFill>
+                <a:latin typeface="+mn-lt"/>
+                <a:ea typeface="+mn-ea"/>
+                <a:cs typeface="+mn-cs"/>
+              </a:defRPr>
+            </a:lvl7pPr>
+            <a:lvl8pPr marL="3200400" algn="l" defTabSz="914400" rtl="0" eaLnBrk="1" latinLnBrk="0" hangingPunct="1">
+              <a:defRPr sz="1800" kern="1200">
+                <a:solidFill>
+                  <a:schemeClr val="lt1"/>
+                </a:solidFill>
+                <a:latin typeface="+mn-lt"/>
+                <a:ea typeface="+mn-ea"/>
+                <a:cs typeface="+mn-cs"/>
+              </a:defRPr>
+            </a:lvl8pPr>
+            <a:lvl9pPr marL="3657600" algn="l" defTabSz="914400" rtl="0" eaLnBrk="1" latinLnBrk="0" hangingPunct="1">
+              <a:defRPr sz="1800" kern="1200">
+                <a:solidFill>
+                  <a:schemeClr val="lt1"/>
+                </a:solidFill>
+                <a:latin typeface="+mn-lt"/>
+                <a:ea typeface="+mn-ea"/>
+                <a:cs typeface="+mn-cs"/>
+              </a:defRPr>
+            </a:lvl9pPr>
+          </a:lstStyle>
+          <a:p>
+            <a:pPr algn="ctr"/>
+            <a:r>
+              <a:rPr lang="en-US" dirty="0">
+                <a:solidFill>
+                  <a:srgbClr val="D0832F"/>
+                </a:solidFill>
+              </a:rPr>
+              <a:t>inner class</a:t>
+            </a:r>
+          </a:p>
+        </p:txBody>
+      </p:sp>
+      <p:sp>
+        <p:nvSpPr>
+          <p:cNvPr id="16" name="Rectangle 15">
+            <a:extLst>
+              <a:ext uri="{FF2B5EF4-FFF2-40B4-BE49-F238E27FC236}">
+                <a16:creationId xmlns:a16="http://schemas.microsoft.com/office/drawing/2014/main" id="{08E8E382-31E6-524B-AAE3-BE910FCAEC0A}"/>
+              </a:ext>
+            </a:extLst>
+          </p:cNvPr>
+          <p:cNvSpPr/>
+          <p:nvPr/>
+        </p:nvSpPr>
+        <p:spPr>
+          <a:xfrm>
+            <a:off x="1080653" y="4261245"/>
+            <a:ext cx="3038961" cy="1816893"/>
+          </a:xfrm>
+          <a:prstGeom prst="rect">
+            <a:avLst/>
+          </a:prstGeom>
+          <a:solidFill>
+            <a:srgbClr val="A6B3BF"/>
+          </a:solidFill>
+          <a:ln w="28575">
+            <a:solidFill>
+              <a:srgbClr val="D0832F"/>
+            </a:solidFill>
+          </a:ln>
+        </p:spPr>
+        <p:style>
+          <a:lnRef idx="2">
+            <a:schemeClr val="accent1">
+              <a:shade val="50000"/>
+            </a:schemeClr>
+          </a:lnRef>
+          <a:fillRef idx="1">
+            <a:schemeClr val="accent1"/>
+          </a:fillRef>
+          <a:effectRef idx="0">
+            <a:schemeClr val="accent1"/>
+          </a:effectRef>
+          <a:fontRef idx="minor">
+            <a:schemeClr val="lt1"/>
+          </a:fontRef>
+        </p:style>
+        <p:txBody>
+          <a:bodyPr rot="0" spcFirstLastPara="0" vert="horz" wrap="square" lIns="91440" tIns="45720" rIns="91440" bIns="45720" numCol="1" spcCol="0" rtlCol="0" fromWordArt="0" anchor="t" anchorCtr="0" forceAA="0" compatLnSpc="1">
+            <a:prstTxWarp prst="textNoShape">
+              <a:avLst/>
+            </a:prstTxWarp>
+            <a:noAutofit/>
+          </a:bodyPr>
+          <a:lstStyle>
+            <a:defPPr>
+              <a:defRPr lang="en-HU"/>
+            </a:defPPr>
+            <a:lvl1pPr marL="0" algn="l" defTabSz="914400" rtl="0" eaLnBrk="1" latinLnBrk="0" hangingPunct="1">
+              <a:defRPr sz="1800" kern="1200">
+                <a:solidFill>
+                  <a:schemeClr val="lt1"/>
+                </a:solidFill>
+                <a:latin typeface="+mn-lt"/>
+                <a:ea typeface="+mn-ea"/>
+                <a:cs typeface="+mn-cs"/>
+              </a:defRPr>
+            </a:lvl1pPr>
+            <a:lvl2pPr marL="457200" algn="l" defTabSz="914400" rtl="0" eaLnBrk="1" latinLnBrk="0" hangingPunct="1">
+              <a:defRPr sz="1800" kern="1200">
+                <a:solidFill>
+                  <a:schemeClr val="lt1"/>
+                </a:solidFill>
+                <a:latin typeface="+mn-lt"/>
+                <a:ea typeface="+mn-ea"/>
+                <a:cs typeface="+mn-cs"/>
+              </a:defRPr>
+            </a:lvl2pPr>
+            <a:lvl3pPr marL="914400" algn="l" defTabSz="914400" rtl="0" eaLnBrk="1" latinLnBrk="0" hangingPunct="1">
+              <a:defRPr sz="1800" kern="1200">
+                <a:solidFill>
+                  <a:schemeClr val="lt1"/>
+                </a:solidFill>
+                <a:latin typeface="+mn-lt"/>
+                <a:ea typeface="+mn-ea"/>
+                <a:cs typeface="+mn-cs"/>
+              </a:defRPr>
+            </a:lvl3pPr>
+            <a:lvl4pPr marL="1371600" algn="l" defTabSz="914400" rtl="0" eaLnBrk="1" latinLnBrk="0" hangingPunct="1">
+              <a:defRPr sz="1800" kern="1200">
+                <a:solidFill>
+                  <a:schemeClr val="lt1"/>
+                </a:solidFill>
+                <a:latin typeface="+mn-lt"/>
+                <a:ea typeface="+mn-ea"/>
+                <a:cs typeface="+mn-cs"/>
+              </a:defRPr>
+            </a:lvl4pPr>
+            <a:lvl5pPr marL="1828800" algn="l" defTabSz="914400" rtl="0" eaLnBrk="1" latinLnBrk="0" hangingPunct="1">
+              <a:defRPr sz="1800" kern="1200">
+                <a:solidFill>
+                  <a:schemeClr val="lt1"/>
+                </a:solidFill>
+                <a:latin typeface="+mn-lt"/>
+                <a:ea typeface="+mn-ea"/>
+                <a:cs typeface="+mn-cs"/>
+              </a:defRPr>
+            </a:lvl5pPr>
+            <a:lvl6pPr marL="2286000" algn="l" defTabSz="914400" rtl="0" eaLnBrk="1" latinLnBrk="0" hangingPunct="1">
+              <a:defRPr sz="1800" kern="1200">
+                <a:solidFill>
+                  <a:schemeClr val="lt1"/>
+                </a:solidFill>
+                <a:latin typeface="+mn-lt"/>
+                <a:ea typeface="+mn-ea"/>
+                <a:cs typeface="+mn-cs"/>
+              </a:defRPr>
+            </a:lvl6pPr>
+            <a:lvl7pPr marL="2743200" algn="l" defTabSz="914400" rtl="0" eaLnBrk="1" latinLnBrk="0" hangingPunct="1">
+              <a:defRPr sz="1800" kern="1200">
+                <a:solidFill>
+                  <a:schemeClr val="lt1"/>
+                </a:solidFill>
+                <a:latin typeface="+mn-lt"/>
+                <a:ea typeface="+mn-ea"/>
+                <a:cs typeface="+mn-cs"/>
+              </a:defRPr>
+            </a:lvl7pPr>
+            <a:lvl8pPr marL="3200400" algn="l" defTabSz="914400" rtl="0" eaLnBrk="1" latinLnBrk="0" hangingPunct="1">
+              <a:defRPr sz="1800" kern="1200">
+                <a:solidFill>
+                  <a:schemeClr val="lt1"/>
+                </a:solidFill>
+                <a:latin typeface="+mn-lt"/>
+                <a:ea typeface="+mn-ea"/>
+                <a:cs typeface="+mn-cs"/>
+              </a:defRPr>
+            </a:lvl8pPr>
+            <a:lvl9pPr marL="3657600" algn="l" defTabSz="914400" rtl="0" eaLnBrk="1" latinLnBrk="0" hangingPunct="1">
+              <a:defRPr sz="1800" kern="1200">
+                <a:solidFill>
+                  <a:schemeClr val="lt1"/>
+                </a:solidFill>
+                <a:latin typeface="+mn-lt"/>
+                <a:ea typeface="+mn-ea"/>
+                <a:cs typeface="+mn-cs"/>
+              </a:defRPr>
+            </a:lvl9pPr>
+          </a:lstStyle>
+          <a:p>
+            <a:pPr algn="ctr"/>
+            <a:r>
+              <a:rPr lang="en-US" dirty="0">
+                <a:solidFill>
+                  <a:srgbClr val="D0832F"/>
+                </a:solidFill>
+              </a:rPr>
+              <a:t>inner class</a:t>
+            </a:r>
+          </a:p>
+        </p:txBody>
+      </p:sp>
+      <p:sp>
+        <p:nvSpPr>
+          <p:cNvPr id="17" name="Oval 16">
+            <a:extLst>
+              <a:ext uri="{FF2B5EF4-FFF2-40B4-BE49-F238E27FC236}">
+                <a16:creationId xmlns:a16="http://schemas.microsoft.com/office/drawing/2014/main" id="{73FE7D2E-1479-9A42-A06E-05EEE0344699}"/>
+              </a:ext>
+            </a:extLst>
+          </p:cNvPr>
+          <p:cNvSpPr/>
+          <p:nvPr/>
+        </p:nvSpPr>
+        <p:spPr>
+          <a:xfrm>
+            <a:off x="1385501" y="4656698"/>
+            <a:ext cx="1400175" cy="1228725"/>
+          </a:xfrm>
+          <a:prstGeom prst="ellipse">
+            <a:avLst/>
+          </a:prstGeom>
+          <a:solidFill>
+            <a:srgbClr val="A6B3BF"/>
+          </a:solidFill>
+          <a:ln w="28575">
+            <a:solidFill>
+              <a:srgbClr val="D0832F"/>
+            </a:solidFill>
+          </a:ln>
+        </p:spPr>
+        <p:style>
+          <a:lnRef idx="2">
+            <a:schemeClr val="accent1">
+              <a:shade val="50000"/>
+            </a:schemeClr>
+          </a:lnRef>
+          <a:fillRef idx="1">
+            <a:schemeClr val="accent1"/>
+          </a:fillRef>
+          <a:effectRef idx="0">
+            <a:schemeClr val="accent1"/>
+          </a:effectRef>
+          <a:fontRef idx="minor">
+            <a:schemeClr val="lt1"/>
+          </a:fontRef>
+        </p:style>
+        <p:txBody>
+          <a:bodyPr rtlCol="0" anchor="ctr"/>
+          <a:lstStyle/>
+          <a:p>
+            <a:pPr algn="ctr"/>
+            <a:r>
+              <a:rPr lang="en-US" dirty="0">
+                <a:solidFill>
+                  <a:srgbClr val="D0832F"/>
+                </a:solidFill>
+              </a:rPr>
+              <a:t>private</a:t>
+            </a:r>
+          </a:p>
+        </p:txBody>
+      </p:sp>
+      <p:sp>
+        <p:nvSpPr>
+          <p:cNvPr id="18" name="Oval 17">
+            <a:extLst>
+              <a:ext uri="{FF2B5EF4-FFF2-40B4-BE49-F238E27FC236}">
+                <a16:creationId xmlns:a16="http://schemas.microsoft.com/office/drawing/2014/main" id="{5FC5DA70-4F94-FF48-A6D4-C4AF44A5FE09}"/>
+              </a:ext>
+            </a:extLst>
+          </p:cNvPr>
+          <p:cNvSpPr/>
+          <p:nvPr/>
+        </p:nvSpPr>
+        <p:spPr>
+          <a:xfrm>
+            <a:off x="1385500" y="2751422"/>
+            <a:ext cx="1400175" cy="1228725"/>
+          </a:xfrm>
+          <a:prstGeom prst="ellipse">
+            <a:avLst/>
+          </a:prstGeom>
+          <a:solidFill>
+            <a:srgbClr val="A6B3BF"/>
+          </a:solidFill>
+          <a:ln w="28575">
+            <a:solidFill>
+              <a:srgbClr val="D0832F"/>
+            </a:solidFill>
+          </a:ln>
+        </p:spPr>
+        <p:style>
+          <a:lnRef idx="2">
+            <a:schemeClr val="accent1">
+              <a:shade val="50000"/>
+            </a:schemeClr>
+          </a:lnRef>
+          <a:fillRef idx="1">
+            <a:schemeClr val="accent1"/>
+          </a:fillRef>
+          <a:effectRef idx="0">
+            <a:schemeClr val="accent1"/>
+          </a:effectRef>
+          <a:fontRef idx="minor">
+            <a:schemeClr val="lt1"/>
+          </a:fontRef>
+        </p:style>
+        <p:txBody>
+          <a:bodyPr rtlCol="0" anchor="ctr"/>
+          <a:lstStyle/>
+          <a:p>
+            <a:pPr algn="ctr"/>
+            <a:r>
+              <a:rPr lang="en-US" dirty="0">
+                <a:solidFill>
+                  <a:srgbClr val="D0832F"/>
+                </a:solidFill>
+              </a:rPr>
+              <a:t>private</a:t>
+            </a:r>
+          </a:p>
+        </p:txBody>
+      </p:sp>
+      <p:sp>
+        <p:nvSpPr>
+          <p:cNvPr id="19" name="Oval 18">
+            <a:extLst>
+              <a:ext uri="{FF2B5EF4-FFF2-40B4-BE49-F238E27FC236}">
+                <a16:creationId xmlns:a16="http://schemas.microsoft.com/office/drawing/2014/main" id="{3ACEA9BF-B930-5649-8FA4-83152A95187C}"/>
+              </a:ext>
+            </a:extLst>
+          </p:cNvPr>
+          <p:cNvSpPr/>
+          <p:nvPr/>
+        </p:nvSpPr>
+        <p:spPr>
+          <a:xfrm>
+            <a:off x="6442414" y="3365784"/>
+            <a:ext cx="1400175" cy="1228725"/>
+          </a:xfrm>
+          <a:prstGeom prst="ellipse">
+            <a:avLst/>
+          </a:prstGeom>
+          <a:solidFill>
+            <a:srgbClr val="A6B3BF"/>
+          </a:solidFill>
+          <a:ln w="28575">
+            <a:solidFill>
+              <a:srgbClr val="D0832F"/>
+            </a:solidFill>
+          </a:ln>
+        </p:spPr>
+        <p:style>
+          <a:lnRef idx="2">
+            <a:schemeClr val="accent1">
+              <a:shade val="50000"/>
+            </a:schemeClr>
+          </a:lnRef>
+          <a:fillRef idx="1">
+            <a:schemeClr val="accent1"/>
+          </a:fillRef>
+          <a:effectRef idx="0">
+            <a:schemeClr val="accent1"/>
+          </a:effectRef>
+          <a:fontRef idx="minor">
+            <a:schemeClr val="lt1"/>
+          </a:fontRef>
+        </p:style>
+        <p:txBody>
+          <a:bodyPr rtlCol="0" anchor="ctr"/>
+          <a:lstStyle/>
+          <a:p>
+            <a:pPr algn="ctr"/>
+            <a:r>
+              <a:rPr lang="en-US" dirty="0">
+                <a:solidFill>
+                  <a:srgbClr val="D0832F"/>
+                </a:solidFill>
+              </a:rPr>
+              <a:t>private</a:t>
+            </a:r>
+          </a:p>
+        </p:txBody>
+      </p:sp>
+      <p:cxnSp>
+        <p:nvCxnSpPr>
+          <p:cNvPr id="23" name="Straight Arrow Connector 22">
+            <a:extLst>
+              <a:ext uri="{FF2B5EF4-FFF2-40B4-BE49-F238E27FC236}">
+                <a16:creationId xmlns:a16="http://schemas.microsoft.com/office/drawing/2014/main" id="{E146C1BF-A92B-EA44-B580-840AF5510CB9}"/>
+              </a:ext>
+            </a:extLst>
+          </p:cNvPr>
+          <p:cNvCxnSpPr>
+            <a:cxnSpLocks/>
+            <a:stCxn id="18" idx="6"/>
+            <a:endCxn id="19" idx="1"/>
+          </p:cNvCxnSpPr>
+          <p:nvPr/>
+        </p:nvCxnSpPr>
+        <p:spPr>
+          <a:xfrm>
+            <a:off x="2785675" y="3365785"/>
+            <a:ext cx="3861790" cy="179942"/>
+          </a:xfrm>
+          <a:prstGeom prst="straightConnector1">
+            <a:avLst/>
+          </a:prstGeom>
+          <a:ln w="76200">
+            <a:solidFill>
+              <a:srgbClr val="C00000"/>
+            </a:solidFill>
+            <a:headEnd type="arrow" w="med" len="med"/>
+            <a:tailEnd type="arrow" w="med" len="med"/>
+          </a:ln>
+        </p:spPr>
+        <p:style>
+          <a:lnRef idx="1">
+            <a:schemeClr val="accent1"/>
+          </a:lnRef>
+          <a:fillRef idx="0">
+            <a:schemeClr val="accent1"/>
+          </a:fillRef>
+          <a:effectRef idx="0">
+            <a:schemeClr val="accent1"/>
+          </a:effectRef>
+          <a:fontRef idx="minor">
+            <a:schemeClr val="tx1"/>
+          </a:fontRef>
+        </p:style>
+      </p:cxnSp>
+      <p:cxnSp>
+        <p:nvCxnSpPr>
+          <p:cNvPr id="25" name="Straight Arrow Connector 24">
+            <a:extLst>
+              <a:ext uri="{FF2B5EF4-FFF2-40B4-BE49-F238E27FC236}">
+                <a16:creationId xmlns:a16="http://schemas.microsoft.com/office/drawing/2014/main" id="{5AC3B4AA-BB6E-9E4A-9E20-460ABC8BFF6A}"/>
+              </a:ext>
+            </a:extLst>
+          </p:cNvPr>
+          <p:cNvCxnSpPr>
+            <a:cxnSpLocks/>
+            <a:stCxn id="17" idx="6"/>
+            <a:endCxn id="19" idx="3"/>
+          </p:cNvCxnSpPr>
+          <p:nvPr/>
+        </p:nvCxnSpPr>
+        <p:spPr>
+          <a:xfrm flipV="1">
+            <a:off x="2785676" y="4414566"/>
+            <a:ext cx="3861789" cy="856495"/>
+          </a:xfrm>
+          <a:prstGeom prst="straightConnector1">
+            <a:avLst/>
+          </a:prstGeom>
+          <a:ln w="76200">
+            <a:solidFill>
+              <a:srgbClr val="C00000"/>
+            </a:solidFill>
+            <a:headEnd type="arrow" w="med" len="med"/>
+            <a:tailEnd type="arrow" w="med" len="med"/>
+          </a:ln>
+        </p:spPr>
+        <p:style>
+          <a:lnRef idx="1">
+            <a:schemeClr val="accent1"/>
+          </a:lnRef>
+          <a:fillRef idx="0">
+            <a:schemeClr val="accent1"/>
+          </a:fillRef>
+          <a:effectRef idx="0">
+            <a:schemeClr val="accent1"/>
+          </a:effectRef>
+          <a:fontRef idx="minor">
+            <a:schemeClr val="tx1"/>
+          </a:fontRef>
+        </p:style>
+      </p:cxnSp>
+      <p:cxnSp>
+        <p:nvCxnSpPr>
+          <p:cNvPr id="29" name="Straight Arrow Connector 28">
+            <a:extLst>
+              <a:ext uri="{FF2B5EF4-FFF2-40B4-BE49-F238E27FC236}">
+                <a16:creationId xmlns:a16="http://schemas.microsoft.com/office/drawing/2014/main" id="{7E160287-D9B0-DF4C-9639-6FC574972632}"/>
+              </a:ext>
+            </a:extLst>
+          </p:cNvPr>
+          <p:cNvCxnSpPr>
+            <a:cxnSpLocks/>
+            <a:stCxn id="17" idx="1"/>
+            <a:endCxn id="18" idx="3"/>
+          </p:cNvCxnSpPr>
+          <p:nvPr/>
+        </p:nvCxnSpPr>
+        <p:spPr>
+          <a:xfrm flipH="1" flipV="1">
+            <a:off x="1590551" y="3800204"/>
+            <a:ext cx="1" cy="1036437"/>
+          </a:xfrm>
+          <a:prstGeom prst="straightConnector1">
+            <a:avLst/>
+          </a:prstGeom>
+          <a:ln w="76200">
+            <a:solidFill>
+              <a:srgbClr val="C00000"/>
+            </a:solidFill>
+            <a:headEnd type="arrow" w="med" len="med"/>
+            <a:tailEnd type="arrow" w="med" len="med"/>
+          </a:ln>
+        </p:spPr>
+        <p:style>
+          <a:lnRef idx="1">
+            <a:schemeClr val="accent1"/>
+          </a:lnRef>
+          <a:fillRef idx="0">
+            <a:schemeClr val="accent1"/>
+          </a:fillRef>
+          <a:effectRef idx="0">
+            <a:schemeClr val="accent1"/>
+          </a:effectRef>
+          <a:fontRef idx="minor">
+            <a:schemeClr val="tx1"/>
+          </a:fontRef>
+        </p:style>
+      </p:cxnSp>
+    </p:spTree>
+    <p:extLst>
+      <p:ext uri="{BB962C8B-B14F-4D97-AF65-F5344CB8AC3E}">
+        <p14:creationId xmlns:p14="http://schemas.microsoft.com/office/powerpoint/2010/main" val="1020083662"/>
+      </p:ext>
+    </p:extLst>
+  </p:cSld>
+  <p:clrMapOvr>
+    <a:masterClrMapping/>
+  </p:clrMapOvr>
+</p:sld>
+</file>
+
+<file path=ppt/slides/slide17.xml><?xml version="1.0" encoding="utf-8"?>
+<p:sld xmlns:a="http://schemas.openxmlformats.org/drawingml/2006/main" xmlns:r="http://schemas.openxmlformats.org/officeDocument/2006/relationships" xmlns:p="http://schemas.openxmlformats.org/presentationml/2006/main">
+  <p:cSld>
+    <p:spTree>
+      <p:nvGrpSpPr>
+        <p:cNvPr id="1" name=""/>
+        <p:cNvGrpSpPr/>
+        <p:nvPr/>
+      </p:nvGrpSpPr>
+      <p:grpSpPr>
+        <a:xfrm>
+          <a:off x="0" y="0"/>
+          <a:ext cx="0" cy="0"/>
+          <a:chOff x="0" y="0"/>
+          <a:chExt cx="0" cy="0"/>
+        </a:xfrm>
+      </p:grpSpPr>
+      <p:sp>
+        <p:nvSpPr>
+          <p:cNvPr id="2" name="Title 1">
+            <a:extLst>
+              <a:ext uri="{FF2B5EF4-FFF2-40B4-BE49-F238E27FC236}">
+                <a16:creationId xmlns:a16="http://schemas.microsoft.com/office/drawing/2014/main" id="{DE82B03C-980B-BC4C-A757-1749FFB53745}"/>
+              </a:ext>
+            </a:extLst>
+          </p:cNvPr>
+          <p:cNvSpPr>
+            <a:spLocks noGrp="1"/>
+          </p:cNvSpPr>
+          <p:nvPr>
+            <p:ph type="title"/>
+          </p:nvPr>
+        </p:nvSpPr>
+        <p:spPr/>
+        <p:txBody>
+          <a:bodyPr/>
+          <a:lstStyle/>
+          <a:p>
+            <a:r>
+              <a:rPr lang="en-US" dirty="0"/>
+              <a:t>private… </a:t>
+            </a:r>
+            <a:r>
+              <a:rPr lang="en-US" dirty="0">
+                <a:solidFill>
+                  <a:srgbClr val="D0832F"/>
+                </a:solidFill>
+              </a:rPr>
+              <a:t>DEMO</a:t>
+            </a:r>
+          </a:p>
+        </p:txBody>
+      </p:sp>
+      <p:sp>
+        <p:nvSpPr>
+          <p:cNvPr id="3" name="Content Placeholder 2">
+            <a:extLst>
+              <a:ext uri="{FF2B5EF4-FFF2-40B4-BE49-F238E27FC236}">
+                <a16:creationId xmlns:a16="http://schemas.microsoft.com/office/drawing/2014/main" id="{564387FB-2B02-014F-AFC6-C2E79FD8B216}"/>
+              </a:ext>
+            </a:extLst>
+          </p:cNvPr>
+          <p:cNvSpPr>
+            <a:spLocks noGrp="1"/>
+          </p:cNvSpPr>
+          <p:nvPr>
+            <p:ph idx="1"/>
+          </p:nvPr>
+        </p:nvSpPr>
+        <p:spPr/>
+        <p:txBody>
+          <a:bodyPr/>
+          <a:lstStyle/>
+          <a:p>
+            <a:endParaRPr lang="en-US" dirty="0">
+              <a:solidFill>
+                <a:srgbClr val="FECC71"/>
+              </a:solidFill>
+            </a:endParaRPr>
+          </a:p>
+        </p:txBody>
+      </p:sp>
+    </p:spTree>
+    <p:extLst>
+      <p:ext uri="{BB962C8B-B14F-4D97-AF65-F5344CB8AC3E}">
+        <p14:creationId xmlns:p14="http://schemas.microsoft.com/office/powerpoint/2010/main" val="748467045"/>
+      </p:ext>
+    </p:extLst>
+  </p:cSld>
+  <p:clrMapOvr>
+    <a:masterClrMapping/>
+  </p:clrMapOvr>
+</p:sld>
+</file>
+
+<file path=ppt/slides/slide18.xml><?xml version="1.0" encoding="utf-8"?>
+<p:sld xmlns:a="http://schemas.openxmlformats.org/drawingml/2006/main" xmlns:r="http://schemas.openxmlformats.org/officeDocument/2006/relationships" xmlns:p="http://schemas.openxmlformats.org/presentationml/2006/main">
+  <p:cSld>
+    <p:spTree>
+      <p:nvGrpSpPr>
+        <p:cNvPr id="1" name=""/>
+        <p:cNvGrpSpPr/>
+        <p:nvPr/>
+      </p:nvGrpSpPr>
+      <p:grpSpPr>
+        <a:xfrm>
+          <a:off x="0" y="0"/>
+          <a:ext cx="0" cy="0"/>
+          <a:chOff x="0" y="0"/>
+          <a:chExt cx="0" cy="0"/>
+        </a:xfrm>
+      </p:grpSpPr>
+      <p:sp>
+        <p:nvSpPr>
+          <p:cNvPr id="2" name="Title 1">
+            <a:extLst>
+              <a:ext uri="{FF2B5EF4-FFF2-40B4-BE49-F238E27FC236}">
+                <a16:creationId xmlns:a16="http://schemas.microsoft.com/office/drawing/2014/main" id="{DE82B03C-980B-BC4C-A757-1749FFB53745}"/>
+              </a:ext>
+            </a:extLst>
+          </p:cNvPr>
+          <p:cNvSpPr>
+            <a:spLocks noGrp="1"/>
+          </p:cNvSpPr>
+          <p:nvPr>
+            <p:ph type="title"/>
+          </p:nvPr>
+        </p:nvSpPr>
+        <p:spPr/>
+        <p:txBody>
+          <a:bodyPr/>
+          <a:lstStyle/>
+          <a:p>
+            <a:r>
+              <a:rPr lang="en-US" dirty="0"/>
+              <a:t>package access … </a:t>
+            </a:r>
+            <a:r>
+              <a:rPr lang="en-US" dirty="0">
+                <a:solidFill>
+                  <a:srgbClr val="D0832F"/>
+                </a:solidFill>
+              </a:rPr>
+              <a:t>almost</a:t>
+            </a:r>
+          </a:p>
+        </p:txBody>
+      </p:sp>
+      <p:sp>
+        <p:nvSpPr>
+          <p:cNvPr id="3" name="Content Placeholder 2">
+            <a:extLst>
+              <a:ext uri="{FF2B5EF4-FFF2-40B4-BE49-F238E27FC236}">
+                <a16:creationId xmlns:a16="http://schemas.microsoft.com/office/drawing/2014/main" id="{564387FB-2B02-014F-AFC6-C2E79FD8B216}"/>
+              </a:ext>
+            </a:extLst>
+          </p:cNvPr>
+          <p:cNvSpPr>
+            <a:spLocks noGrp="1"/>
+          </p:cNvSpPr>
+          <p:nvPr>
+            <p:ph idx="1"/>
+          </p:nvPr>
+        </p:nvSpPr>
+        <p:spPr/>
+        <p:txBody>
+          <a:bodyPr/>
+          <a:lstStyle/>
+          <a:p>
+            <a:r>
+              <a:rPr lang="en-US" dirty="0">
+                <a:solidFill>
+                  <a:srgbClr val="FECC71"/>
+                </a:solidFill>
+              </a:rPr>
+              <a:t>“when we do not specify any modifier”</a:t>
+            </a:r>
+          </a:p>
+          <a:p>
+            <a:endParaRPr lang="en-US" dirty="0">
+              <a:solidFill>
+                <a:srgbClr val="FECC71"/>
+              </a:solidFill>
+            </a:endParaRPr>
+          </a:p>
+          <a:p>
+            <a:pPr marL="0" indent="0">
+              <a:buNone/>
+            </a:pPr>
+            <a:r>
+              <a:rPr lang="en-US" dirty="0">
+                <a:solidFill>
+                  <a:srgbClr val="FECC71"/>
+                </a:solidFill>
+              </a:rPr>
+              <a:t>is only when we are in a class or </a:t>
+            </a:r>
+            <a:r>
+              <a:rPr lang="en-US" dirty="0" err="1">
+                <a:solidFill>
+                  <a:srgbClr val="FECC71"/>
+                </a:solidFill>
+              </a:rPr>
+              <a:t>enum</a:t>
+            </a:r>
+            <a:endParaRPr lang="en-US" dirty="0">
+              <a:solidFill>
+                <a:srgbClr val="FECC71"/>
+              </a:solidFill>
+            </a:endParaRPr>
+          </a:p>
+          <a:p>
+            <a:pPr marL="0" indent="0">
+              <a:buNone/>
+            </a:pPr>
+            <a:r>
+              <a:rPr lang="en-US" dirty="0">
+                <a:solidFill>
+                  <a:srgbClr val="FECC71"/>
+                </a:solidFill>
+              </a:rPr>
+              <a:t>The default in an interface is public.</a:t>
+            </a:r>
+          </a:p>
+          <a:p>
+            <a:endParaRPr lang="en-US" dirty="0">
+              <a:solidFill>
+                <a:srgbClr val="FECC71"/>
+              </a:solidFill>
+            </a:endParaRPr>
+          </a:p>
+        </p:txBody>
+      </p:sp>
+    </p:spTree>
+    <p:extLst>
+      <p:ext uri="{BB962C8B-B14F-4D97-AF65-F5344CB8AC3E}">
+        <p14:creationId xmlns:p14="http://schemas.microsoft.com/office/powerpoint/2010/main" val="1398495299"/>
+      </p:ext>
+    </p:extLst>
+  </p:cSld>
+  <p:clrMapOvr>
+    <a:masterClrMapping/>
+  </p:clrMapOvr>
+</p:sld>
+</file>
+
+<file path=ppt/slides/slide19.xml><?xml version="1.0" encoding="utf-8"?>
+<p:sld xmlns:a="http://schemas.openxmlformats.org/drawingml/2006/main" xmlns:r="http://schemas.openxmlformats.org/officeDocument/2006/relationships" xmlns:p="http://schemas.openxmlformats.org/presentationml/2006/main">
+  <p:cSld>
+    <p:spTree>
+      <p:nvGrpSpPr>
+        <p:cNvPr id="1" name=""/>
+        <p:cNvGrpSpPr/>
+        <p:nvPr/>
+      </p:nvGrpSpPr>
+      <p:grpSpPr>
+        <a:xfrm>
+          <a:off x="0" y="0"/>
+          <a:ext cx="0" cy="0"/>
+          <a:chOff x="0" y="0"/>
+          <a:chExt cx="0" cy="0"/>
+        </a:xfrm>
+      </p:grpSpPr>
+      <p:sp>
+        <p:nvSpPr>
+          <p:cNvPr id="2" name="Title 1">
+            <a:extLst>
+              <a:ext uri="{FF2B5EF4-FFF2-40B4-BE49-F238E27FC236}">
+                <a16:creationId xmlns:a16="http://schemas.microsoft.com/office/drawing/2014/main" id="{DE82B03C-980B-BC4C-A757-1749FFB53745}"/>
+              </a:ext>
+            </a:extLst>
+          </p:cNvPr>
+          <p:cNvSpPr>
+            <a:spLocks noGrp="1"/>
+          </p:cNvSpPr>
+          <p:nvPr>
+            <p:ph type="title"/>
+          </p:nvPr>
+        </p:nvSpPr>
+        <p:spPr/>
+        <p:txBody>
+          <a:bodyPr/>
+          <a:lstStyle/>
+          <a:p>
+            <a:r>
+              <a:rPr lang="en-US" dirty="0"/>
+              <a:t>protected … </a:t>
+            </a:r>
+            <a:r>
+              <a:rPr lang="en-US" dirty="0">
+                <a:solidFill>
+                  <a:srgbClr val="D0832F"/>
+                </a:solidFill>
+              </a:rPr>
+              <a:t>almost</a:t>
+            </a:r>
+          </a:p>
+        </p:txBody>
+      </p:sp>
+      <p:sp>
+        <p:nvSpPr>
+          <p:cNvPr id="3" name="Content Placeholder 2">
+            <a:extLst>
+              <a:ext uri="{FF2B5EF4-FFF2-40B4-BE49-F238E27FC236}">
+                <a16:creationId xmlns:a16="http://schemas.microsoft.com/office/drawing/2014/main" id="{564387FB-2B02-014F-AFC6-C2E79FD8B216}"/>
+              </a:ext>
+            </a:extLst>
+          </p:cNvPr>
+          <p:cNvSpPr>
+            <a:spLocks noGrp="1"/>
+          </p:cNvSpPr>
+          <p:nvPr>
+            <p:ph idx="1"/>
+          </p:nvPr>
+        </p:nvSpPr>
+        <p:spPr/>
+        <p:txBody>
+          <a:bodyPr/>
+          <a:lstStyle/>
+          <a:p>
+            <a:r>
+              <a:rPr lang="en-US" dirty="0">
+                <a:solidFill>
+                  <a:srgbClr val="FECC71"/>
+                </a:solidFill>
+              </a:rPr>
+              <a:t>is visible only in the same package private and</a:t>
+            </a:r>
+          </a:p>
+          <a:p>
+            <a:r>
+              <a:rPr lang="en-US" dirty="0">
+                <a:solidFill>
+                  <a:srgbClr val="FECC71"/>
+                </a:solidFill>
+              </a:rPr>
+              <a:t>from classes that extend the defining class</a:t>
+            </a:r>
+          </a:p>
+          <a:p>
+            <a:endParaRPr lang="en-US" dirty="0">
+              <a:solidFill>
+                <a:srgbClr val="FECC71"/>
+              </a:solidFill>
+            </a:endParaRPr>
+          </a:p>
+          <a:p>
+            <a:r>
+              <a:rPr lang="en-US" dirty="0">
+                <a:solidFill>
+                  <a:srgbClr val="FECC71"/>
+                </a:solidFill>
+              </a:rPr>
+              <a:t>“only by code that is responsible for the implementation of that object.”</a:t>
+            </a:r>
+          </a:p>
+        </p:txBody>
+      </p:sp>
+    </p:spTree>
+    <p:extLst>
+      <p:ext uri="{BB962C8B-B14F-4D97-AF65-F5344CB8AC3E}">
+        <p14:creationId xmlns:p14="http://schemas.microsoft.com/office/powerpoint/2010/main" val="2113053607"/>
+      </p:ext>
+    </p:extLst>
+  </p:cSld>
+  <p:clrMapOvr>
+    <a:masterClrMapping/>
+  </p:clrMapOvr>
+</p:sld>
+</file>
+
 <file path=ppt/slides/slide2.xml><?xml version="1.0" encoding="utf-8"?>
 <p:sld xmlns:a="http://schemas.openxmlformats.org/drawingml/2006/main" xmlns:r="http://schemas.openxmlformats.org/officeDocument/2006/relationships" xmlns:p="http://schemas.openxmlformats.org/presentationml/2006/main">
   <p:cSld>
@@ -5538,6 +9383,453 @@
 </p:sld>
 </file>
 
+<file path=ppt/slides/slide20.xml><?xml version="1.0" encoding="utf-8"?>
+<p:sld xmlns:a="http://schemas.openxmlformats.org/drawingml/2006/main" xmlns:r="http://schemas.openxmlformats.org/officeDocument/2006/relationships" xmlns:p="http://schemas.openxmlformats.org/presentationml/2006/main">
+  <p:cSld>
+    <p:spTree>
+      <p:nvGrpSpPr>
+        <p:cNvPr id="1" name=""/>
+        <p:cNvGrpSpPr/>
+        <p:nvPr/>
+      </p:nvGrpSpPr>
+      <p:grpSpPr>
+        <a:xfrm>
+          <a:off x="0" y="0"/>
+          <a:ext cx="0" cy="0"/>
+          <a:chOff x="0" y="0"/>
+          <a:chExt cx="0" cy="0"/>
+        </a:xfrm>
+      </p:grpSpPr>
+      <p:pic>
+        <p:nvPicPr>
+          <p:cNvPr id="8" name="Picture 7">
+            <a:extLst>
+              <a:ext uri="{FF2B5EF4-FFF2-40B4-BE49-F238E27FC236}">
+                <a16:creationId xmlns:a16="http://schemas.microsoft.com/office/drawing/2014/main" id="{8190BB15-865F-084A-A661-35EAE28163E5}"/>
+              </a:ext>
+            </a:extLst>
+          </p:cNvPr>
+          <p:cNvPicPr>
+            <a:picLocks noChangeAspect="1"/>
+          </p:cNvPicPr>
+          <p:nvPr/>
+        </p:nvPicPr>
+        <p:blipFill>
+          <a:blip r:embed="rId3"/>
+          <a:stretch>
+            <a:fillRect/>
+          </a:stretch>
+        </p:blipFill>
+        <p:spPr>
+          <a:xfrm>
+            <a:off x="0" y="-291166"/>
+            <a:ext cx="12192000" cy="7440332"/>
+          </a:xfrm>
+          <a:prstGeom prst="rect">
+            <a:avLst/>
+          </a:prstGeom>
+        </p:spPr>
+      </p:pic>
+      <p:sp>
+        <p:nvSpPr>
+          <p:cNvPr id="9" name="Oval 8">
+            <a:extLst>
+              <a:ext uri="{FF2B5EF4-FFF2-40B4-BE49-F238E27FC236}">
+                <a16:creationId xmlns:a16="http://schemas.microsoft.com/office/drawing/2014/main" id="{7FFA970F-2B36-CC4F-8853-D22B50208AE2}"/>
+              </a:ext>
+            </a:extLst>
+          </p:cNvPr>
+          <p:cNvSpPr/>
+          <p:nvPr/>
+        </p:nvSpPr>
+        <p:spPr>
+          <a:xfrm>
+            <a:off x="387927" y="616527"/>
+            <a:ext cx="11139054" cy="1717963"/>
+          </a:xfrm>
+          <a:prstGeom prst="ellipse">
+            <a:avLst/>
+          </a:prstGeom>
+          <a:noFill/>
+          <a:ln w="57150">
+            <a:solidFill>
+              <a:srgbClr val="C00000"/>
+            </a:solidFill>
+          </a:ln>
+        </p:spPr>
+        <p:style>
+          <a:lnRef idx="2">
+            <a:schemeClr val="accent1">
+              <a:shade val="50000"/>
+            </a:schemeClr>
+          </a:lnRef>
+          <a:fillRef idx="1">
+            <a:schemeClr val="accent1"/>
+          </a:fillRef>
+          <a:effectRef idx="0">
+            <a:schemeClr val="accent1"/>
+          </a:effectRef>
+          <a:fontRef idx="minor">
+            <a:schemeClr val="lt1"/>
+          </a:fontRef>
+        </p:style>
+        <p:txBody>
+          <a:bodyPr rot="0" spcFirstLastPara="0" vert="horz" wrap="square" lIns="91440" tIns="45720" rIns="91440" bIns="45720" numCol="1" spcCol="0" rtlCol="0" fromWordArt="0" anchor="ctr" anchorCtr="0" forceAA="0" compatLnSpc="1">
+            <a:prstTxWarp prst="textNoShape">
+              <a:avLst/>
+            </a:prstTxWarp>
+            <a:noAutofit/>
+          </a:bodyPr>
+          <a:lstStyle>
+            <a:defPPr>
+              <a:defRPr lang="en-HU"/>
+            </a:defPPr>
+            <a:lvl1pPr marL="0" algn="l" defTabSz="914400" rtl="0" eaLnBrk="1" latinLnBrk="0" hangingPunct="1">
+              <a:defRPr sz="1800" kern="1200">
+                <a:solidFill>
+                  <a:schemeClr val="lt1"/>
+                </a:solidFill>
+                <a:latin typeface="+mn-lt"/>
+                <a:ea typeface="+mn-ea"/>
+                <a:cs typeface="+mn-cs"/>
+              </a:defRPr>
+            </a:lvl1pPr>
+            <a:lvl2pPr marL="457200" algn="l" defTabSz="914400" rtl="0" eaLnBrk="1" latinLnBrk="0" hangingPunct="1">
+              <a:defRPr sz="1800" kern="1200">
+                <a:solidFill>
+                  <a:schemeClr val="lt1"/>
+                </a:solidFill>
+                <a:latin typeface="+mn-lt"/>
+                <a:ea typeface="+mn-ea"/>
+                <a:cs typeface="+mn-cs"/>
+              </a:defRPr>
+            </a:lvl2pPr>
+            <a:lvl3pPr marL="914400" algn="l" defTabSz="914400" rtl="0" eaLnBrk="1" latinLnBrk="0" hangingPunct="1">
+              <a:defRPr sz="1800" kern="1200">
+                <a:solidFill>
+                  <a:schemeClr val="lt1"/>
+                </a:solidFill>
+                <a:latin typeface="+mn-lt"/>
+                <a:ea typeface="+mn-ea"/>
+                <a:cs typeface="+mn-cs"/>
+              </a:defRPr>
+            </a:lvl3pPr>
+            <a:lvl4pPr marL="1371600" algn="l" defTabSz="914400" rtl="0" eaLnBrk="1" latinLnBrk="0" hangingPunct="1">
+              <a:defRPr sz="1800" kern="1200">
+                <a:solidFill>
+                  <a:schemeClr val="lt1"/>
+                </a:solidFill>
+                <a:latin typeface="+mn-lt"/>
+                <a:ea typeface="+mn-ea"/>
+                <a:cs typeface="+mn-cs"/>
+              </a:defRPr>
+            </a:lvl4pPr>
+            <a:lvl5pPr marL="1828800" algn="l" defTabSz="914400" rtl="0" eaLnBrk="1" latinLnBrk="0" hangingPunct="1">
+              <a:defRPr sz="1800" kern="1200">
+                <a:solidFill>
+                  <a:schemeClr val="lt1"/>
+                </a:solidFill>
+                <a:latin typeface="+mn-lt"/>
+                <a:ea typeface="+mn-ea"/>
+                <a:cs typeface="+mn-cs"/>
+              </a:defRPr>
+            </a:lvl5pPr>
+            <a:lvl6pPr marL="2286000" algn="l" defTabSz="914400" rtl="0" eaLnBrk="1" latinLnBrk="0" hangingPunct="1">
+              <a:defRPr sz="1800" kern="1200">
+                <a:solidFill>
+                  <a:schemeClr val="lt1"/>
+                </a:solidFill>
+                <a:latin typeface="+mn-lt"/>
+                <a:ea typeface="+mn-ea"/>
+                <a:cs typeface="+mn-cs"/>
+              </a:defRPr>
+            </a:lvl6pPr>
+            <a:lvl7pPr marL="2743200" algn="l" defTabSz="914400" rtl="0" eaLnBrk="1" latinLnBrk="0" hangingPunct="1">
+              <a:defRPr sz="1800" kern="1200">
+                <a:solidFill>
+                  <a:schemeClr val="lt1"/>
+                </a:solidFill>
+                <a:latin typeface="+mn-lt"/>
+                <a:ea typeface="+mn-ea"/>
+                <a:cs typeface="+mn-cs"/>
+              </a:defRPr>
+            </a:lvl7pPr>
+            <a:lvl8pPr marL="3200400" algn="l" defTabSz="914400" rtl="0" eaLnBrk="1" latinLnBrk="0" hangingPunct="1">
+              <a:defRPr sz="1800" kern="1200">
+                <a:solidFill>
+                  <a:schemeClr val="lt1"/>
+                </a:solidFill>
+                <a:latin typeface="+mn-lt"/>
+                <a:ea typeface="+mn-ea"/>
+                <a:cs typeface="+mn-cs"/>
+              </a:defRPr>
+            </a:lvl8pPr>
+            <a:lvl9pPr marL="3657600" algn="l" defTabSz="914400" rtl="0" eaLnBrk="1" latinLnBrk="0" hangingPunct="1">
+              <a:defRPr sz="1800" kern="1200">
+                <a:solidFill>
+                  <a:schemeClr val="lt1"/>
+                </a:solidFill>
+                <a:latin typeface="+mn-lt"/>
+                <a:ea typeface="+mn-ea"/>
+                <a:cs typeface="+mn-cs"/>
+              </a:defRPr>
+            </a:lvl9pPr>
+          </a:lstStyle>
+          <a:p>
+            <a:pPr algn="ctr"/>
+            <a:endParaRPr lang="en-US"/>
+          </a:p>
+        </p:txBody>
+      </p:sp>
+    </p:spTree>
+    <p:extLst>
+      <p:ext uri="{BB962C8B-B14F-4D97-AF65-F5344CB8AC3E}">
+        <p14:creationId xmlns:p14="http://schemas.microsoft.com/office/powerpoint/2010/main" val="1019035296"/>
+      </p:ext>
+    </p:extLst>
+  </p:cSld>
+  <p:clrMapOvr>
+    <a:masterClrMapping/>
+  </p:clrMapOvr>
+  <p:timing>
+    <p:tnLst>
+      <p:par>
+        <p:cTn id="1" dur="indefinite" restart="never" nodeType="tmRoot">
+          <p:childTnLst>
+            <p:seq concurrent="1" nextAc="seek">
+              <p:cTn id="2" dur="indefinite" nodeType="mainSeq">
+                <p:childTnLst>
+                  <p:par>
+                    <p:cTn id="3" fill="hold">
+                      <p:stCondLst>
+                        <p:cond delay="indefinite"/>
+                      </p:stCondLst>
+                      <p:childTnLst>
+                        <p:par>
+                          <p:cTn id="4" fill="hold">
+                            <p:stCondLst>
+                              <p:cond delay="0"/>
+                            </p:stCondLst>
+                            <p:childTnLst>
+                              <p:par>
+                                <p:cTn id="5" presetID="1" presetClass="entr" presetSubtype="0" fill="hold" grpId="0" nodeType="clickEffect">
+                                  <p:stCondLst>
+                                    <p:cond delay="0"/>
+                                  </p:stCondLst>
+                                  <p:childTnLst>
+                                    <p:set>
+                                      <p:cBhvr>
+                                        <p:cTn id="6" dur="1" fill="hold">
+                                          <p:stCondLst>
+                                            <p:cond delay="0"/>
+                                          </p:stCondLst>
+                                        </p:cTn>
+                                        <p:tgtEl>
+                                          <p:spTgt spid="9"/>
+                                        </p:tgtEl>
+                                        <p:attrNameLst>
+                                          <p:attrName>style.visibility</p:attrName>
+                                        </p:attrNameLst>
+                                      </p:cBhvr>
+                                      <p:to>
+                                        <p:strVal val="visible"/>
+                                      </p:to>
+                                    </p:set>
+                                  </p:childTnLst>
+                                </p:cTn>
+                              </p:par>
+                            </p:childTnLst>
+                          </p:cTn>
+                        </p:par>
+                      </p:childTnLst>
+                    </p:cTn>
+                  </p:par>
+                </p:childTnLst>
+              </p:cTn>
+              <p:prevCondLst>
+                <p:cond evt="onPrev" delay="0">
+                  <p:tgtEl>
+                    <p:sldTgt/>
+                  </p:tgtEl>
+                </p:cond>
+              </p:prevCondLst>
+              <p:nextCondLst>
+                <p:cond evt="onNext" delay="0">
+                  <p:tgtEl>
+                    <p:sldTgt/>
+                  </p:tgtEl>
+                </p:cond>
+              </p:nextCondLst>
+            </p:seq>
+          </p:childTnLst>
+        </p:cTn>
+      </p:par>
+    </p:tnLst>
+    <p:bldLst>
+      <p:bldP spid="9" grpId="0" animBg="1"/>
+    </p:bldLst>
+  </p:timing>
+</p:sld>
+</file>
+
+<file path=ppt/slides/slide21.xml><?xml version="1.0" encoding="utf-8"?>
+<p:sld xmlns:a="http://schemas.openxmlformats.org/drawingml/2006/main" xmlns:r="http://schemas.openxmlformats.org/officeDocument/2006/relationships" xmlns:p="http://schemas.openxmlformats.org/presentationml/2006/main">
+  <p:cSld>
+    <p:spTree>
+      <p:nvGrpSpPr>
+        <p:cNvPr id="1" name=""/>
+        <p:cNvGrpSpPr/>
+        <p:nvPr/>
+      </p:nvGrpSpPr>
+      <p:grpSpPr>
+        <a:xfrm>
+          <a:off x="0" y="0"/>
+          <a:ext cx="0" cy="0"/>
+          <a:chOff x="0" y="0"/>
+          <a:chExt cx="0" cy="0"/>
+        </a:xfrm>
+      </p:grpSpPr>
+      <p:pic>
+        <p:nvPicPr>
+          <p:cNvPr id="2" name="Picture 1">
+            <a:extLst>
+              <a:ext uri="{FF2B5EF4-FFF2-40B4-BE49-F238E27FC236}">
+                <a16:creationId xmlns:a16="http://schemas.microsoft.com/office/drawing/2014/main" id="{2C06300D-7430-164E-BB4A-5B727E2B5E5B}"/>
+              </a:ext>
+            </a:extLst>
+          </p:cNvPr>
+          <p:cNvPicPr>
+            <a:picLocks noChangeAspect="1"/>
+          </p:cNvPicPr>
+          <p:nvPr/>
+        </p:nvPicPr>
+        <p:blipFill>
+          <a:blip r:embed="rId3"/>
+          <a:stretch>
+            <a:fillRect/>
+          </a:stretch>
+        </p:blipFill>
+        <p:spPr>
+          <a:xfrm>
+            <a:off x="0" y="-259123"/>
+            <a:ext cx="12192000" cy="7376245"/>
+          </a:xfrm>
+          <a:prstGeom prst="rect">
+            <a:avLst/>
+          </a:prstGeom>
+        </p:spPr>
+      </p:pic>
+    </p:spTree>
+    <p:extLst>
+      <p:ext uri="{BB962C8B-B14F-4D97-AF65-F5344CB8AC3E}">
+        <p14:creationId xmlns:p14="http://schemas.microsoft.com/office/powerpoint/2010/main" val="283456833"/>
+      </p:ext>
+    </p:extLst>
+  </p:cSld>
+  <p:clrMapOvr>
+    <a:masterClrMapping/>
+  </p:clrMapOvr>
+</p:sld>
+</file>
+
+<file path=ppt/slides/slide22.xml><?xml version="1.0" encoding="utf-8"?>
+<p:sld xmlns:a="http://schemas.openxmlformats.org/drawingml/2006/main" xmlns:r="http://schemas.openxmlformats.org/officeDocument/2006/relationships" xmlns:p="http://schemas.openxmlformats.org/presentationml/2006/main">
+  <p:cSld>
+    <p:spTree>
+      <p:nvGrpSpPr>
+        <p:cNvPr id="1" name=""/>
+        <p:cNvGrpSpPr/>
+        <p:nvPr/>
+      </p:nvGrpSpPr>
+      <p:grpSpPr>
+        <a:xfrm>
+          <a:off x="0" y="0"/>
+          <a:ext cx="0" cy="0"/>
+          <a:chOff x="0" y="0"/>
+          <a:chExt cx="0" cy="0"/>
+        </a:xfrm>
+      </p:grpSpPr>
+      <p:sp>
+        <p:nvSpPr>
+          <p:cNvPr id="2" name="Title 1">
+            <a:extLst>
+              <a:ext uri="{FF2B5EF4-FFF2-40B4-BE49-F238E27FC236}">
+                <a16:creationId xmlns:a16="http://schemas.microsoft.com/office/drawing/2014/main" id="{DE82B03C-980B-BC4C-A757-1749FFB53745}"/>
+              </a:ext>
+            </a:extLst>
+          </p:cNvPr>
+          <p:cNvSpPr>
+            <a:spLocks noGrp="1"/>
+          </p:cNvSpPr>
+          <p:nvPr>
+            <p:ph type="title"/>
+          </p:nvPr>
+        </p:nvSpPr>
+        <p:spPr/>
+        <p:txBody>
+          <a:bodyPr/>
+          <a:lstStyle/>
+          <a:p>
+            <a:r>
+              <a:rPr lang="en-US" dirty="0"/>
+              <a:t>protected … </a:t>
+            </a:r>
+            <a:r>
+              <a:rPr lang="en-US" dirty="0">
+                <a:solidFill>
+                  <a:srgbClr val="D0832F"/>
+                </a:solidFill>
+              </a:rPr>
+              <a:t>DEMO</a:t>
+            </a:r>
+          </a:p>
+        </p:txBody>
+      </p:sp>
+      <p:sp>
+        <p:nvSpPr>
+          <p:cNvPr id="3" name="Content Placeholder 2">
+            <a:extLst>
+              <a:ext uri="{FF2B5EF4-FFF2-40B4-BE49-F238E27FC236}">
+                <a16:creationId xmlns:a16="http://schemas.microsoft.com/office/drawing/2014/main" id="{564387FB-2B02-014F-AFC6-C2E79FD8B216}"/>
+              </a:ext>
+            </a:extLst>
+          </p:cNvPr>
+          <p:cNvSpPr>
+            <a:spLocks noGrp="1"/>
+          </p:cNvSpPr>
+          <p:nvPr>
+            <p:ph idx="1"/>
+          </p:nvPr>
+        </p:nvSpPr>
+        <p:spPr/>
+        <p:txBody>
+          <a:bodyPr/>
+          <a:lstStyle/>
+          <a:p>
+            <a:r>
+              <a:rPr lang="en-US" dirty="0">
+                <a:solidFill>
+                  <a:srgbClr val="FECC71"/>
+                </a:solidFill>
+              </a:rPr>
+              <a:t>PLACEHOLDER TO BE REMOVED FROM THE VIDEO</a:t>
+            </a:r>
+          </a:p>
+        </p:txBody>
+      </p:sp>
+    </p:spTree>
+    <p:extLst>
+      <p:ext uri="{BB962C8B-B14F-4D97-AF65-F5344CB8AC3E}">
+        <p14:creationId xmlns:p14="http://schemas.microsoft.com/office/powerpoint/2010/main" val="1183611767"/>
+      </p:ext>
+    </p:extLst>
+  </p:cSld>
+  <p:clrMapOvr>
+    <a:masterClrMapping/>
+  </p:clrMapOvr>
+</p:sld>
+</file>
+
 <file path=ppt/slides/slide3.xml><?xml version="1.0" encoding="utf-8"?>
 <p:sld xmlns:a="http://schemas.openxmlformats.org/drawingml/2006/main" xmlns:r="http://schemas.openxmlformats.org/officeDocument/2006/relationships" xmlns:p="http://schemas.openxmlformats.org/presentationml/2006/main">
   <p:cSld>
@@ -5637,7 +9929,7 @@
                   <a:srgbClr val="FECC71"/>
                 </a:solidFill>
               </a:rPr>
-              <a:t>package private (no keyword in classes)</a:t>
+              <a:t>package access (no keyword in classes)</a:t>
             </a:r>
           </a:p>
           <a:p>
@@ -6162,7 +10454,7 @@
           <a:p>
             <a:r>
               <a:rPr lang="en-US" dirty="0"/>
-              <a:t>package private</a:t>
+              <a:t>package access</a:t>
             </a:r>
           </a:p>
         </p:txBody>

</xml_diff>